<commit_message>
strating to update cheatsheet
</commit_message>
<xml_diff>
--- a/cheatsheet/labelled_cheatsheet.pptx
+++ b/cheatsheet/labelled_cheatsheet.pptx
@@ -2334,7 +2334,7 @@
           </a:ln>
           <a:extLst>
             <a:ext uri="{C572A759-6A51-4108-AA02-DFA0A04FC94B}">
-              <ma14:wrappingTextBoxFlag xmlns:ma14="http://schemas.microsoft.com/office/mac/drawingml/2011/main" xmlns:a14="http://schemas.microsoft.com/office/drawing/2010/main" xmlns:m="http://schemas.openxmlformats.org/officeDocument/2006/math" xmlns="" val="1"/>
+              <ma14:wrappingTextBoxFlag xmlns="" xmlns:m="http://schemas.openxmlformats.org/officeDocument/2006/math" xmlns:a14="http://schemas.microsoft.com/office/drawing/2010/main" xmlns:ma14="http://schemas.microsoft.com/office/mac/drawingml/2011/main" val="1"/>
             </a:ext>
           </a:extLst>
         </p:spPr>
@@ -2373,7 +2373,7 @@
           </a:ln>
           <a:extLst>
             <a:ext uri="{C572A759-6A51-4108-AA02-DFA0A04FC94B}">
-              <ma14:wrappingTextBoxFlag xmlns:ma14="http://schemas.microsoft.com/office/mac/drawingml/2011/main" xmlns:a14="http://schemas.microsoft.com/office/drawing/2010/main" xmlns:m="http://schemas.openxmlformats.org/officeDocument/2006/math" xmlns="" val="1"/>
+              <ma14:wrappingTextBoxFlag xmlns="" xmlns:m="http://schemas.openxmlformats.org/officeDocument/2006/math" xmlns:a14="http://schemas.microsoft.com/office/drawing/2010/main" xmlns:ma14="http://schemas.microsoft.com/office/mac/drawingml/2011/main" val="1"/>
             </a:ext>
           </a:extLst>
         </p:spPr>
@@ -4224,9 +4224,7 @@
             <p:nvPr/>
           </p:nvPicPr>
           <p:blipFill>
-            <a:blip r:embed="rId3">
-              <a:extLst/>
-            </a:blip>
+            <a:blip r:embed="rId3"/>
             <a:stretch>
               <a:fillRect/>
             </a:stretch>
@@ -4355,7 +4353,7 @@
           </a:ln>
           <a:extLst>
             <a:ext uri="{C572A759-6A51-4108-AA02-DFA0A04FC94B}">
-              <ma14:wrappingTextBoxFlag xmlns:ma14="http://schemas.microsoft.com/office/mac/drawingml/2011/main" xmlns:a14="http://schemas.microsoft.com/office/drawing/2010/main" xmlns:m="http://schemas.openxmlformats.org/officeDocument/2006/math" xmlns="" val="1"/>
+              <ma14:wrappingTextBoxFlag xmlns="" xmlns:m="http://schemas.openxmlformats.org/officeDocument/2006/math" xmlns:a14="http://schemas.microsoft.com/office/drawing/2010/main" xmlns:ma14="http://schemas.microsoft.com/office/mac/drawingml/2011/main" val="1"/>
             </a:ext>
           </a:extLst>
         </p:spPr>
@@ -4391,7 +4389,7 @@
             </a:r>
             <a:r>
               <a:rPr lang="en-US" dirty="0"/>
-              <a:t> •  labelled version  2.2.0 •  Updated: 2019-05</a:t>
+              <a:t> •  labelled version  2.4.0 •  Updated: 2020-06</a:t>
             </a:r>
           </a:p>
         </p:txBody>
@@ -4621,7 +4619,7 @@
           </a:ln>
           <a:extLst>
             <a:ext uri="{C572A759-6A51-4108-AA02-DFA0A04FC94B}">
-              <ma14:wrappingTextBoxFlag xmlns:ma14="http://schemas.microsoft.com/office/mac/drawingml/2011/main" xmlns:a14="http://schemas.microsoft.com/office/drawing/2010/main" xmlns:m="http://schemas.openxmlformats.org/officeDocument/2006/math" xmlns="" val="1"/>
+              <ma14:wrappingTextBoxFlag xmlns="" xmlns:m="http://schemas.openxmlformats.org/officeDocument/2006/math" xmlns:a14="http://schemas.microsoft.com/office/drawing/2010/main" xmlns:ma14="http://schemas.microsoft.com/office/mac/drawingml/2011/main" val="1"/>
             </a:ext>
           </a:extLst>
         </p:spPr>
@@ -4747,7 +4745,7 @@
             <a:effectLst/>
             <a:extLst>
               <a:ext uri="{C572A759-6A51-4108-AA02-DFA0A04FC94B}">
-                <ma14:wrappingTextBoxFlag xmlns:ma14="http://schemas.microsoft.com/office/mac/drawingml/2011/main" xmlns:a14="http://schemas.microsoft.com/office/drawing/2010/main" xmlns:m="http://schemas.openxmlformats.org/officeDocument/2006/math" xmlns="" val="1"/>
+                <ma14:wrappingTextBoxFlag xmlns="" xmlns:m="http://schemas.openxmlformats.org/officeDocument/2006/math" xmlns:a14="http://schemas.microsoft.com/office/drawing/2010/main" xmlns:ma14="http://schemas.microsoft.com/office/mac/drawingml/2011/main" val="1"/>
               </a:ext>
             </a:extLst>
           </p:spPr>
@@ -5183,7 +5181,7 @@
                 <a:cs typeface="Source Sans Pro"/>
                 <a:sym typeface="Source Sans Pro"/>
               </a:rPr>
-              <a:t>(names associated to specific values)</a:t>
+              <a:t>(labels associated to specific values)</a:t>
             </a:r>
           </a:p>
           <a:p>
@@ -5335,7 +5333,35 @@
                 <a:uFillTx/>
                 <a:sym typeface="Source Sans Pro"/>
               </a:rPr>
-              <a:t>(x)    or     </a:t>
+              <a:t>(x)    </a:t>
+            </a:r>
+            <a:r>
+              <a:rPr kumimoji="0" lang="en-GB" sz="1200" b="0" i="1" u="none" strike="noStrike" cap="none" spc="0" normalizeH="0" baseline="0" dirty="0">
+                <a:ln>
+                  <a:noFill/>
+                </a:ln>
+                <a:solidFill>
+                  <a:srgbClr val="000000"/>
+                </a:solidFill>
+                <a:effectLst/>
+                <a:uFillTx/>
+                <a:sym typeface="Source Sans Pro"/>
+              </a:rPr>
+              <a:t>or</a:t>
+            </a:r>
+            <a:r>
+              <a:rPr kumimoji="0" lang="en-GB" sz="1200" b="0" i="0" u="none" strike="noStrike" cap="none" spc="0" normalizeH="0" baseline="0" dirty="0">
+                <a:ln>
+                  <a:noFill/>
+                </a:ln>
+                <a:solidFill>
+                  <a:srgbClr val="000000"/>
+                </a:solidFill>
+                <a:effectLst/>
+                <a:uFillTx/>
+                <a:sym typeface="Source Sans Pro"/>
+              </a:rPr>
+              <a:t>     </a:t>
             </a:r>
             <a:r>
               <a:rPr lang="en-GB" dirty="0" err="1">
@@ -5555,7 +5581,7 @@
             <a:effectLst/>
             <a:extLst>
               <a:ext uri="{C572A759-6A51-4108-AA02-DFA0A04FC94B}">
-                <ma14:wrappingTextBoxFlag xmlns:ma14="http://schemas.microsoft.com/office/mac/drawingml/2011/main" xmlns:a14="http://schemas.microsoft.com/office/drawing/2010/main" xmlns:m="http://schemas.openxmlformats.org/officeDocument/2006/math" xmlns="" val="1"/>
+                <ma14:wrappingTextBoxFlag xmlns="" xmlns:m="http://schemas.openxmlformats.org/officeDocument/2006/math" xmlns:a14="http://schemas.microsoft.com/office/drawing/2010/main" xmlns:ma14="http://schemas.microsoft.com/office/mac/drawingml/2011/main" val="1"/>
               </a:ext>
             </a:extLst>
           </p:spPr>
@@ -5678,7 +5704,7 @@
             <a:effectLst/>
             <a:extLst>
               <a:ext uri="{C572A759-6A51-4108-AA02-DFA0A04FC94B}">
-                <ma14:wrappingTextBoxFlag xmlns:ma14="http://schemas.microsoft.com/office/mac/drawingml/2011/main" xmlns:a14="http://schemas.microsoft.com/office/drawing/2010/main" xmlns:m="http://schemas.openxmlformats.org/officeDocument/2006/math" xmlns="" val="1"/>
+                <ma14:wrappingTextBoxFlag xmlns="" xmlns:m="http://schemas.openxmlformats.org/officeDocument/2006/math" xmlns:a14="http://schemas.microsoft.com/office/drawing/2010/main" xmlns:ma14="http://schemas.microsoft.com/office/mac/drawingml/2011/main" val="1"/>
               </a:ext>
             </a:extLst>
           </p:spPr>
@@ -6036,7 +6062,39 @@
                   <a:srgbClr val="000000"/>
                 </a:solidFill>
               </a:rPr>
-              <a:t>(df)</a:t>
+              <a:t>(df)    </a:t>
+            </a:r>
+            <a:r>
+              <a:rPr lang="en-GB" b="0" i="1" dirty="0">
+                <a:solidFill>
+                  <a:srgbClr val="000000"/>
+                </a:solidFill>
+              </a:rPr>
+              <a:t>or</a:t>
+            </a:r>
+            <a:r>
+              <a:rPr lang="en-GB" b="0" dirty="0">
+                <a:solidFill>
+                  <a:srgbClr val="000000"/>
+                </a:solidFill>
+              </a:rPr>
+              <a:t>    df %&gt;% </a:t>
+            </a:r>
+            <a:r>
+              <a:rPr lang="en-GB" dirty="0" err="1">
+                <a:solidFill>
+                  <a:srgbClr val="000000"/>
+                </a:solidFill>
+              </a:rPr>
+              <a:t>look_for</a:t>
+            </a:r>
+            <a:r>
+              <a:rPr lang="en-GB" b="0" dirty="0">
+                <a:solidFill>
+                  <a:srgbClr val="000000"/>
+                </a:solidFill>
+              </a:rPr>
+              <a:t>() </a:t>
             </a:r>
             <a:br>
               <a:rPr lang="en-GB" b="0" dirty="0">
@@ -6077,7 +6135,39 @@
                   <a:srgbClr val="000000"/>
                 </a:solidFill>
               </a:rPr>
-              <a:t>(df, "s")</a:t>
+              <a:t>(df, "s")    </a:t>
+            </a:r>
+            <a:r>
+              <a:rPr lang="en-GB" b="0" i="1" dirty="0">
+                <a:solidFill>
+                  <a:srgbClr val="000000"/>
+                </a:solidFill>
+              </a:rPr>
+              <a:t>or</a:t>
+            </a:r>
+            <a:r>
+              <a:rPr lang="en-GB" b="0" dirty="0">
+                <a:solidFill>
+                  <a:srgbClr val="000000"/>
+                </a:solidFill>
+              </a:rPr>
+              <a:t>    df %&gt;% </a:t>
+            </a:r>
+            <a:r>
+              <a:rPr lang="en-GB" dirty="0" err="1">
+                <a:solidFill>
+                  <a:srgbClr val="000000"/>
+                </a:solidFill>
+              </a:rPr>
+              <a:t>look_for</a:t>
+            </a:r>
+            <a:r>
+              <a:rPr lang="en-GB" b="0" dirty="0">
+                <a:solidFill>
+                  <a:srgbClr val="000000"/>
+                </a:solidFill>
+              </a:rPr>
+              <a:t>("s")</a:t>
             </a:r>
             <a:br>
               <a:rPr lang="en-GB" b="0" dirty="0">
@@ -6186,7 +6276,7 @@
             <a:effectLst/>
             <a:extLst>
               <a:ext uri="{C572A759-6A51-4108-AA02-DFA0A04FC94B}">
-                <ma14:wrappingTextBoxFlag xmlns:ma14="http://schemas.microsoft.com/office/mac/drawingml/2011/main" xmlns:a14="http://schemas.microsoft.com/office/drawing/2010/main" xmlns:m="http://schemas.openxmlformats.org/officeDocument/2006/math" xmlns="" val="1"/>
+                <ma14:wrappingTextBoxFlag xmlns="" xmlns:m="http://schemas.openxmlformats.org/officeDocument/2006/math" xmlns:a14="http://schemas.microsoft.com/office/drawing/2010/main" xmlns:ma14="http://schemas.microsoft.com/office/mac/drawingml/2011/main" val="1"/>
               </a:ext>
             </a:extLst>
           </p:spPr>
@@ -6351,7 +6441,35 @@
                 <a:uFillTx/>
                 <a:sym typeface="Source Sans Pro"/>
               </a:rPr>
-              <a:t>(x, value)    or     </a:t>
+              <a:t>(x, value)    </a:t>
+            </a:r>
+            <a:r>
+              <a:rPr kumimoji="0" lang="en-GB" sz="1200" b="0" i="1" u="none" strike="noStrike" cap="none" spc="0" normalizeH="0" baseline="0" dirty="0">
+                <a:ln>
+                  <a:noFill/>
+                </a:ln>
+                <a:solidFill>
+                  <a:srgbClr val="000000"/>
+                </a:solidFill>
+                <a:effectLst/>
+                <a:uFillTx/>
+                <a:sym typeface="Source Sans Pro"/>
+              </a:rPr>
+              <a:t>or</a:t>
+            </a:r>
+            <a:r>
+              <a:rPr kumimoji="0" lang="en-GB" sz="1200" b="0" i="0" u="none" strike="noStrike" cap="none" spc="0" normalizeH="0" baseline="0" dirty="0">
+                <a:ln>
+                  <a:noFill/>
+                </a:ln>
+                <a:solidFill>
+                  <a:srgbClr val="000000"/>
+                </a:solidFill>
+                <a:effectLst/>
+                <a:uFillTx/>
+                <a:sym typeface="Source Sans Pro"/>
+              </a:rPr>
+              <a:t>     </a:t>
             </a:r>
             <a:r>
               <a:rPr lang="en-GB" dirty="0" err="1">
@@ -6628,7 +6746,7 @@
                   <a:srgbClr val="000000"/>
                 </a:solidFill>
               </a:rPr>
-              <a:t>(c("F", "F", "M"), c(Female = "F", Male = "M"))</a:t>
+              <a:t>(c("F", "F", "M"),  c(Female = "F", Male = "M"))</a:t>
             </a:r>
             <a:br>
               <a:rPr lang="en-US" b="0" dirty="0">
@@ -6835,7 +6953,7 @@
             <a:effectLst/>
             <a:extLst>
               <a:ext uri="{C572A759-6A51-4108-AA02-DFA0A04FC94B}">
-                <ma14:wrappingTextBoxFlag xmlns:ma14="http://schemas.microsoft.com/office/mac/drawingml/2011/main" xmlns:a14="http://schemas.microsoft.com/office/drawing/2010/main" xmlns:m="http://schemas.openxmlformats.org/officeDocument/2006/math" xmlns="" val="1"/>
+                <ma14:wrappingTextBoxFlag xmlns="" xmlns:m="http://schemas.openxmlformats.org/officeDocument/2006/math" xmlns:a14="http://schemas.microsoft.com/office/drawing/2010/main" xmlns:ma14="http://schemas.microsoft.com/office/mac/drawingml/2011/main" val="1"/>
               </a:ext>
             </a:extLst>
           </p:spPr>
@@ -6958,7 +7076,7 @@
             <a:effectLst/>
             <a:extLst>
               <a:ext uri="{C572A759-6A51-4108-AA02-DFA0A04FC94B}">
-                <ma14:wrappingTextBoxFlag xmlns:ma14="http://schemas.microsoft.com/office/mac/drawingml/2011/main" xmlns:a14="http://schemas.microsoft.com/office/drawing/2010/main" xmlns:m="http://schemas.openxmlformats.org/officeDocument/2006/math" xmlns="" val="1"/>
+                <ma14:wrappingTextBoxFlag xmlns="" xmlns:m="http://schemas.openxmlformats.org/officeDocument/2006/math" xmlns:a14="http://schemas.microsoft.com/office/drawing/2010/main" xmlns:ma14="http://schemas.microsoft.com/office/mac/drawingml/2011/main" val="1"/>
               </a:ext>
             </a:extLst>
           </p:spPr>
@@ -7344,7 +7462,7 @@
             <a:effectLst/>
             <a:extLst>
               <a:ext uri="{C572A759-6A51-4108-AA02-DFA0A04FC94B}">
-                <ma14:wrappingTextBoxFlag xmlns:ma14="http://schemas.microsoft.com/office/mac/drawingml/2011/main" xmlns:a14="http://schemas.microsoft.com/office/drawing/2010/main" xmlns:m="http://schemas.openxmlformats.org/officeDocument/2006/math" xmlns="" val="1"/>
+                <ma14:wrappingTextBoxFlag xmlns="" xmlns:m="http://schemas.openxmlformats.org/officeDocument/2006/math" xmlns:a14="http://schemas.microsoft.com/office/drawing/2010/main" xmlns:ma14="http://schemas.microsoft.com/office/mac/drawingml/2011/main" val="1"/>
               </a:ext>
             </a:extLst>
           </p:spPr>
@@ -7727,7 +7845,39 @@
                   <a:srgbClr val="000000"/>
                 </a:solidFill>
               </a:rPr>
-              <a:t>(x)</a:t>
+              <a:t>(x)    </a:t>
+            </a:r>
+            <a:r>
+              <a:rPr lang="en-GB" b="0" i="1" dirty="0">
+                <a:solidFill>
+                  <a:srgbClr val="000000"/>
+                </a:solidFill>
+              </a:rPr>
+              <a:t>or</a:t>
+            </a:r>
+            <a:r>
+              <a:rPr lang="en-GB" b="0" dirty="0">
+                <a:solidFill>
+                  <a:srgbClr val="000000"/>
+                </a:solidFill>
+              </a:rPr>
+              <a:t>     df %&gt;% </a:t>
+            </a:r>
+            <a:r>
+              <a:rPr lang="en-GB" dirty="0" err="1">
+                <a:solidFill>
+                  <a:srgbClr val="000000"/>
+                </a:solidFill>
+              </a:rPr>
+              <a:t>user_na_to_na</a:t>
+            </a:r>
+            <a:r>
+              <a:rPr lang="en-GB" b="0" dirty="0">
+                <a:solidFill>
+                  <a:srgbClr val="000000"/>
+                </a:solidFill>
+              </a:rPr>
+              <a:t>()</a:t>
             </a:r>
             <a:br>
               <a:rPr lang="en-GB" b="0" dirty="0">
@@ -7841,7 +7991,7 @@
             <a:effectLst/>
             <a:extLst>
               <a:ext uri="{C572A759-6A51-4108-AA02-DFA0A04FC94B}">
-                <ma14:wrappingTextBoxFlag xmlns:ma14="http://schemas.microsoft.com/office/mac/drawingml/2011/main" xmlns:a14="http://schemas.microsoft.com/office/drawing/2010/main" xmlns:m="http://schemas.openxmlformats.org/officeDocument/2006/math" xmlns="" val="1"/>
+                <ma14:wrappingTextBoxFlag xmlns="" xmlns:m="http://schemas.openxmlformats.org/officeDocument/2006/math" xmlns:a14="http://schemas.microsoft.com/office/drawing/2010/main" xmlns:ma14="http://schemas.microsoft.com/office/mac/drawingml/2011/main" val="1"/>
               </a:ext>
             </a:extLst>
           </p:spPr>
@@ -8409,7 +8559,23 @@
                   <a:srgbClr val="000000"/>
                 </a:solidFill>
               </a:rPr>
-              <a:t>() generates a NA with a tag</a:t>
+              <a:t>(</a:t>
+            </a:r>
+            <a:r>
+              <a:rPr lang="pl-PL" b="0" dirty="0">
+                <a:solidFill>
+                  <a:srgbClr val="000000"/>
+                </a:solidFill>
+              </a:rPr>
+              <a:t>"a"</a:t>
+            </a:r>
+            <a:r>
+              <a:rPr lang="en-GB" b="0" dirty="0">
+                <a:solidFill>
+                  <a:srgbClr val="000000"/>
+                </a:solidFill>
+              </a:rPr>
+              <a:t>) generates a NA with a tag</a:t>
             </a:r>
           </a:p>
           <a:p>
@@ -8631,7 +8797,7 @@
             <a:effectLst/>
             <a:extLst>
               <a:ext uri="{C572A759-6A51-4108-AA02-DFA0A04FC94B}">
-                <ma14:wrappingTextBoxFlag xmlns:ma14="http://schemas.microsoft.com/office/mac/drawingml/2011/main" xmlns:a14="http://schemas.microsoft.com/office/drawing/2010/main" xmlns:m="http://schemas.openxmlformats.org/officeDocument/2006/math" xmlns="" val="1"/>
+                <ma14:wrappingTextBoxFlag xmlns="" xmlns:m="http://schemas.openxmlformats.org/officeDocument/2006/math" xmlns:a14="http://schemas.microsoft.com/office/drawing/2010/main" xmlns:ma14="http://schemas.microsoft.com/office/mac/drawingml/2011/main" val="1"/>
               </a:ext>
             </a:extLst>
           </p:spPr>
@@ -8771,7 +8937,22 @@
                   <a:srgbClr val="000000"/>
                 </a:solidFill>
               </a:rPr>
-              <a:t>"Tagged" missing values work exactly like regular R missing values except that they store one additional byte of information a tag, which is usually a letter ("a" to "z"). </a:t>
+              <a:t>“Tagged” missing values work exactly like regular R missing values except that they store one additional byte of information:</a:t>
+            </a:r>
+            <a:br>
+              <a:rPr lang="en-US" b="0" dirty="0">
+                <a:solidFill>
+                  <a:srgbClr val="000000"/>
+                </a:solidFill>
+              </a:rPr>
+            </a:br>
+            <a:r>
+              <a:rPr lang="en-US" b="0" dirty="0">
+                <a:solidFill>
+                  <a:srgbClr val="000000"/>
+                </a:solidFill>
+              </a:rPr>
+              <a:t>a tag, which is usually a letter ("a" to "z"). </a:t>
             </a:r>
             <a:endParaRPr kumimoji="0" lang="en-GB" sz="1200" b="0" i="0" u="none" strike="noStrike" cap="none" spc="0" normalizeH="0" baseline="0" dirty="0">
               <a:ln>
@@ -8790,536 +8971,6 @@
           </a:p>
         </p:txBody>
       </p:sp>
-      <p:graphicFrame>
-        <p:nvGraphicFramePr>
-          <p:cNvPr id="70" name="Table">
-            <a:extLst>
-              <a:ext uri="{FF2B5EF4-FFF2-40B4-BE49-F238E27FC236}">
-                <a16:creationId xmlns:a16="http://schemas.microsoft.com/office/drawing/2014/main" id="{35B04448-A784-4AA8-B124-31831B6B972C}"/>
-              </a:ext>
-            </a:extLst>
-          </p:cNvPr>
-          <p:cNvGraphicFramePr/>
-          <p:nvPr>
-            <p:extLst>
-              <p:ext uri="{D42A27DB-BD31-4B8C-83A1-F6EECF244321}">
-                <p14:modId xmlns:p14="http://schemas.microsoft.com/office/powerpoint/2010/main" val="2796325235"/>
-              </p:ext>
-            </p:extLst>
-          </p:nvPr>
-        </p:nvGraphicFramePr>
-        <p:xfrm>
-          <a:off x="4941614" y="8238617"/>
-          <a:ext cx="288000" cy="288000"/>
-        </p:xfrm>
-        <a:graphic>
-          <a:graphicData uri="http://schemas.openxmlformats.org/drawingml/2006/table">
-            <a:tbl>
-              <a:tblPr>
-                <a:tableStyleId>{33BA23B1-9221-436E-865A-0063620EA4FD}</a:tableStyleId>
-              </a:tblPr>
-              <a:tblGrid>
-                <a:gridCol w="72000">
-                  <a:extLst>
-                    <a:ext uri="{9D8B030D-6E8A-4147-A177-3AD203B41FA5}">
-                      <a16:colId xmlns:a16="http://schemas.microsoft.com/office/drawing/2014/main" val="20000"/>
-                    </a:ext>
-                  </a:extLst>
-                </a:gridCol>
-                <a:gridCol w="72000">
-                  <a:extLst>
-                    <a:ext uri="{9D8B030D-6E8A-4147-A177-3AD203B41FA5}">
-                      <a16:colId xmlns:a16="http://schemas.microsoft.com/office/drawing/2014/main" val="20001"/>
-                    </a:ext>
-                  </a:extLst>
-                </a:gridCol>
-                <a:gridCol w="72000">
-                  <a:extLst>
-                    <a:ext uri="{9D8B030D-6E8A-4147-A177-3AD203B41FA5}">
-                      <a16:colId xmlns:a16="http://schemas.microsoft.com/office/drawing/2014/main" val="20002"/>
-                    </a:ext>
-                  </a:extLst>
-                </a:gridCol>
-                <a:gridCol w="72000">
-                  <a:extLst>
-                    <a:ext uri="{9D8B030D-6E8A-4147-A177-3AD203B41FA5}">
-                      <a16:colId xmlns:a16="http://schemas.microsoft.com/office/drawing/2014/main" val="1347651227"/>
-                    </a:ext>
-                  </a:extLst>
-                </a:gridCol>
-              </a:tblGrid>
-              <a:tr h="72000">
-                <a:tc>
-                  <a:txBody>
-                    <a:bodyPr/>
-                    <a:lstStyle/>
-                    <a:p>
-                      <a:pPr defTabSz="914400">
-                        <a:defRPr b="0">
-                          <a:solidFill>
-                            <a:srgbClr val="000000"/>
-                          </a:solidFill>
-                        </a:defRPr>
-                      </a:pPr>
-                      <a:endParaRPr lang="fr-FR" sz="400" b="0" dirty="0">
-                        <a:solidFill>
-                          <a:srgbClr val="FFFFFF"/>
-                        </a:solidFill>
-                        <a:latin typeface="Wingdings" panose="05000000000000000000" pitchFamily="2" charset="2"/>
-                        <a:ea typeface="Helvetica"/>
-                        <a:cs typeface="Helvetica"/>
-                        <a:sym typeface="Helvetica"/>
-                      </a:endParaRPr>
-                    </a:p>
-                  </a:txBody>
-                  <a:tcPr marL="0" marR="0" marT="0" marB="0" anchor="ctr" horzOverflow="overflow">
-                    <a:solidFill>
-                      <a:srgbClr val="A6AAA9"/>
-                    </a:solidFill>
-                  </a:tcPr>
-                </a:tc>
-                <a:tc>
-                  <a:txBody>
-                    <a:bodyPr/>
-                    <a:lstStyle/>
-                    <a:p>
-                      <a:pPr defTabSz="914400">
-                        <a:defRPr b="0">
-                          <a:solidFill>
-                            <a:srgbClr val="000000"/>
-                          </a:solidFill>
-                        </a:defRPr>
-                      </a:pPr>
-                      <a:endParaRPr sz="400" b="0" dirty="0">
-                        <a:solidFill>
-                          <a:srgbClr val="FFFFFF"/>
-                        </a:solidFill>
-                        <a:latin typeface="Wingdings" panose="05000000000000000000" pitchFamily="2" charset="2"/>
-                        <a:ea typeface="Helvetica"/>
-                        <a:cs typeface="Helvetica"/>
-                        <a:sym typeface="Helvetica"/>
-                      </a:endParaRPr>
-                    </a:p>
-                  </a:txBody>
-                  <a:tcPr marL="0" marR="0" marT="0" marB="0" anchor="ctr" horzOverflow="overflow">
-                    <a:solidFill>
-                      <a:srgbClr val="A6AAA9"/>
-                    </a:solidFill>
-                  </a:tcPr>
-                </a:tc>
-                <a:tc>
-                  <a:txBody>
-                    <a:bodyPr/>
-                    <a:lstStyle/>
-                    <a:p>
-                      <a:pPr defTabSz="914400">
-                        <a:defRPr b="0">
-                          <a:solidFill>
-                            <a:srgbClr val="000000"/>
-                          </a:solidFill>
-                        </a:defRPr>
-                      </a:pPr>
-                      <a:endParaRPr sz="400" b="0" dirty="0">
-                        <a:solidFill>
-                          <a:srgbClr val="FFFFFF"/>
-                        </a:solidFill>
-                        <a:latin typeface="Wingdings" panose="05000000000000000000" pitchFamily="2" charset="2"/>
-                        <a:ea typeface="Helvetica"/>
-                        <a:cs typeface="Helvetica"/>
-                        <a:sym typeface="Helvetica"/>
-                      </a:endParaRPr>
-                    </a:p>
-                  </a:txBody>
-                  <a:tcPr marL="0" marR="0" marT="0" marB="0" anchor="ctr" horzOverflow="overflow">
-                    <a:solidFill>
-                      <a:srgbClr val="A6AAA9"/>
-                    </a:solidFill>
-                  </a:tcPr>
-                </a:tc>
-                <a:tc>
-                  <a:txBody>
-                    <a:bodyPr/>
-                    <a:lstStyle/>
-                    <a:p>
-                      <a:pPr algn="l" defTabSz="914400">
-                        <a:defRPr b="0">
-                          <a:solidFill>
-                            <a:srgbClr val="000000"/>
-                          </a:solidFill>
-                        </a:defRPr>
-                      </a:pPr>
-                      <a:endParaRPr sz="400" b="0" dirty="0">
-                        <a:solidFill>
-                          <a:srgbClr val="FFFFFF"/>
-                        </a:solidFill>
-                        <a:latin typeface="Wingdings 3" panose="05040102010807070707" pitchFamily="18" charset="2"/>
-                        <a:ea typeface="Helvetica"/>
-                        <a:cs typeface="Helvetica"/>
-                        <a:sym typeface="Helvetica"/>
-                      </a:endParaRPr>
-                    </a:p>
-                  </a:txBody>
-                  <a:tcPr marL="0" marR="0" marT="0" marB="0" anchor="ctr" horzOverflow="overflow">
-                    <a:solidFill>
-                      <a:schemeClr val="bg1"/>
-                    </a:solidFill>
-                  </a:tcPr>
-                </a:tc>
-                <a:extLst>
-                  <a:ext uri="{0D108BD9-81ED-4DB2-BD59-A6C34878D82A}">
-                    <a16:rowId xmlns:a16="http://schemas.microsoft.com/office/drawing/2014/main" val="10000"/>
-                  </a:ext>
-                </a:extLst>
-              </a:tr>
-              <a:tr h="72000">
-                <a:tc>
-                  <a:txBody>
-                    <a:bodyPr/>
-                    <a:lstStyle/>
-                    <a:p>
-                      <a:pPr defTabSz="914400">
-                        <a:defRPr sz="3600">
-                          <a:latin typeface="Helvetica"/>
-                          <a:ea typeface="Helvetica"/>
-                          <a:cs typeface="Helvetica"/>
-                          <a:sym typeface="Helvetica"/>
-                        </a:defRPr>
-                      </a:pPr>
-                      <a:endParaRPr sz="400" dirty="0">
-                        <a:latin typeface="Wingdings" panose="05000000000000000000" pitchFamily="2" charset="2"/>
-                      </a:endParaRPr>
-                    </a:p>
-                  </a:txBody>
-                  <a:tcPr marL="0" marR="0" marT="0" marB="0" anchor="ctr" horzOverflow="overflow">
-                    <a:solidFill>
-                      <a:srgbClr val="FCDB9F"/>
-                    </a:solidFill>
-                  </a:tcPr>
-                </a:tc>
-                <a:tc>
-                  <a:txBody>
-                    <a:bodyPr/>
-                    <a:lstStyle/>
-                    <a:p>
-                      <a:pPr defTabSz="914400">
-                        <a:defRPr sz="3600">
-                          <a:latin typeface="Helvetica"/>
-                          <a:ea typeface="Helvetica"/>
-                          <a:cs typeface="Helvetica"/>
-                          <a:sym typeface="Helvetica"/>
-                        </a:defRPr>
-                      </a:pPr>
-                      <a:endParaRPr sz="400" dirty="0">
-                        <a:latin typeface="Wingdings" panose="05000000000000000000" pitchFamily="2" charset="2"/>
-                      </a:endParaRPr>
-                    </a:p>
-                  </a:txBody>
-                  <a:tcPr marL="0" marR="0" marT="0" marB="0" anchor="ctr" horzOverflow="overflow">
-                    <a:solidFill>
-                      <a:srgbClr val="FCDB9F"/>
-                    </a:solidFill>
-                  </a:tcPr>
-                </a:tc>
-                <a:tc>
-                  <a:txBody>
-                    <a:bodyPr/>
-                    <a:lstStyle/>
-                    <a:p>
-                      <a:pPr defTabSz="914400">
-                        <a:defRPr sz="3600">
-                          <a:latin typeface="Helvetica"/>
-                          <a:ea typeface="Helvetica"/>
-                          <a:cs typeface="Helvetica"/>
-                          <a:sym typeface="Helvetica"/>
-                        </a:defRPr>
-                      </a:pPr>
-                      <a:endParaRPr sz="400" dirty="0">
-                        <a:latin typeface="Wingdings" panose="05000000000000000000" pitchFamily="2" charset="2"/>
-                      </a:endParaRPr>
-                    </a:p>
-                  </a:txBody>
-                  <a:tcPr marL="0" marR="0" marT="0" marB="0" anchor="ctr" horzOverflow="overflow">
-                    <a:solidFill>
-                      <a:srgbClr val="FCDB9F"/>
-                    </a:solidFill>
-                  </a:tcPr>
-                </a:tc>
-                <a:tc>
-                  <a:txBody>
-                    <a:bodyPr/>
-                    <a:lstStyle/>
-                    <a:p>
-                      <a:pPr algn="l" defTabSz="914400">
-                        <a:defRPr sz="3600">
-                          <a:latin typeface="Helvetica"/>
-                          <a:ea typeface="Helvetica"/>
-                          <a:cs typeface="Helvetica"/>
-                          <a:sym typeface="Helvetica"/>
-                        </a:defRPr>
-                      </a:pPr>
-                      <a:r>
-                        <a:rPr lang="fr-FR" sz="400" dirty="0">
-                          <a:latin typeface="Wingdings 3" panose="05040102010807070707" pitchFamily="18" charset="2"/>
-                        </a:rPr>
-                        <a:t>³</a:t>
-                      </a:r>
-                      <a:endParaRPr sz="400" dirty="0">
-                        <a:latin typeface="Wingdings 3" panose="05040102010807070707" pitchFamily="18" charset="2"/>
-                      </a:endParaRPr>
-                    </a:p>
-                  </a:txBody>
-                  <a:tcPr marL="0" marR="0" marT="0" marB="0" anchor="ctr" horzOverflow="overflow">
-                    <a:solidFill>
-                      <a:schemeClr val="bg1"/>
-                    </a:solidFill>
-                  </a:tcPr>
-                </a:tc>
-                <a:extLst>
-                  <a:ext uri="{0D108BD9-81ED-4DB2-BD59-A6C34878D82A}">
-                    <a16:rowId xmlns:a16="http://schemas.microsoft.com/office/drawing/2014/main" val="10001"/>
-                  </a:ext>
-                </a:extLst>
-              </a:tr>
-              <a:tr h="72000">
-                <a:tc>
-                  <a:txBody>
-                    <a:bodyPr/>
-                    <a:lstStyle/>
-                    <a:p>
-                      <a:pPr defTabSz="914400">
-                        <a:defRPr sz="1000">
-                          <a:latin typeface="Helvetica"/>
-                          <a:ea typeface="Helvetica"/>
-                          <a:cs typeface="Helvetica"/>
-                          <a:sym typeface="Helvetica"/>
-                        </a:defRPr>
-                      </a:pPr>
-                      <a:endParaRPr sz="400" dirty="0">
-                        <a:latin typeface="Wingdings" panose="05000000000000000000" pitchFamily="2" charset="2"/>
-                      </a:endParaRPr>
-                    </a:p>
-                  </a:txBody>
-                  <a:tcPr marL="0" marR="0" marT="0" marB="0" anchor="ctr" horzOverflow="overflow">
-                    <a:solidFill>
-                      <a:srgbClr val="FABF53"/>
-                    </a:solidFill>
-                  </a:tcPr>
-                </a:tc>
-                <a:tc>
-                  <a:txBody>
-                    <a:bodyPr/>
-                    <a:lstStyle/>
-                    <a:p>
-                      <a:pPr defTabSz="914400">
-                        <a:defRPr sz="1000">
-                          <a:latin typeface="Helvetica"/>
-                          <a:ea typeface="Helvetica"/>
-                          <a:cs typeface="Helvetica"/>
-                          <a:sym typeface="Helvetica"/>
-                        </a:defRPr>
-                      </a:pPr>
-                      <a:endParaRPr sz="400" dirty="0">
-                        <a:latin typeface="Wingdings" panose="05000000000000000000" pitchFamily="2" charset="2"/>
-                      </a:endParaRPr>
-                    </a:p>
-                  </a:txBody>
-                  <a:tcPr marL="0" marR="0" marT="0" marB="0" anchor="ctr" horzOverflow="overflow">
-                    <a:solidFill>
-                      <a:srgbClr val="FABF53"/>
-                    </a:solidFill>
-                  </a:tcPr>
-                </a:tc>
-                <a:tc>
-                  <a:txBody>
-                    <a:bodyPr/>
-                    <a:lstStyle/>
-                    <a:p>
-                      <a:pPr defTabSz="914400">
-                        <a:defRPr sz="1000">
-                          <a:latin typeface="Helvetica"/>
-                          <a:ea typeface="Helvetica"/>
-                          <a:cs typeface="Helvetica"/>
-                          <a:sym typeface="Helvetica"/>
-                        </a:defRPr>
-                      </a:pPr>
-                      <a:endParaRPr sz="400" dirty="0">
-                        <a:latin typeface="Wingdings" panose="05000000000000000000" pitchFamily="2" charset="2"/>
-                      </a:endParaRPr>
-                    </a:p>
-                  </a:txBody>
-                  <a:tcPr marL="0" marR="0" marT="0" marB="0" anchor="ctr" horzOverflow="overflow">
-                    <a:solidFill>
-                      <a:srgbClr val="FABF53"/>
-                    </a:solidFill>
-                  </a:tcPr>
-                </a:tc>
-                <a:tc>
-                  <a:txBody>
-                    <a:bodyPr/>
-                    <a:lstStyle/>
-                    <a:p>
-                      <a:pPr marL="0" marR="0" lvl="0" indent="0" algn="l" defTabSz="914400" rtl="0" eaLnBrk="1" fontAlgn="auto" latinLnBrk="0" hangingPunct="1">
-                        <a:lnSpc>
-                          <a:spcPct val="100000"/>
-                        </a:lnSpc>
-                        <a:spcBef>
-                          <a:spcPts val="0"/>
-                        </a:spcBef>
-                        <a:spcAft>
-                          <a:spcPts val="0"/>
-                        </a:spcAft>
-                        <a:buClrTx/>
-                        <a:buSzTx/>
-                        <a:buFontTx/>
-                        <a:buNone/>
-                        <a:tabLst/>
-                        <a:defRPr sz="1000">
-                          <a:latin typeface="Helvetica"/>
-                          <a:ea typeface="Helvetica"/>
-                          <a:cs typeface="Helvetica"/>
-                          <a:sym typeface="Helvetica"/>
-                        </a:defRPr>
-                      </a:pPr>
-                      <a:r>
-                        <a:rPr lang="fr-FR" sz="400" dirty="0">
-                          <a:latin typeface="Wingdings 3" panose="05040102010807070707" pitchFamily="18" charset="2"/>
-                        </a:rPr>
-                        <a:t>³</a:t>
-                      </a:r>
-                    </a:p>
-                  </a:txBody>
-                  <a:tcPr marL="0" marR="0" marT="0" marB="0" anchor="ctr" horzOverflow="overflow">
-                    <a:solidFill>
-                      <a:schemeClr val="bg1"/>
-                    </a:solidFill>
-                  </a:tcPr>
-                </a:tc>
-                <a:extLst>
-                  <a:ext uri="{0D108BD9-81ED-4DB2-BD59-A6C34878D82A}">
-                    <a16:rowId xmlns:a16="http://schemas.microsoft.com/office/drawing/2014/main" val="10002"/>
-                  </a:ext>
-                </a:extLst>
-              </a:tr>
-              <a:tr h="72000">
-                <a:tc>
-                  <a:txBody>
-                    <a:bodyPr/>
-                    <a:lstStyle/>
-                    <a:p>
-                      <a:pPr defTabSz="914400">
-                        <a:defRPr sz="3600">
-                          <a:latin typeface="Helvetica Light"/>
-                          <a:ea typeface="Helvetica Light"/>
-                          <a:cs typeface="Helvetica Light"/>
-                        </a:defRPr>
-                      </a:pPr>
-                      <a:endParaRPr sz="400" dirty="0">
-                        <a:latin typeface="Wingdings" panose="05000000000000000000" pitchFamily="2" charset="2"/>
-                      </a:endParaRPr>
-                    </a:p>
-                  </a:txBody>
-                  <a:tcPr marL="0" marR="0" marT="0" marB="0" anchor="ctr" horzOverflow="overflow">
-                    <a:solidFill>
-                      <a:srgbClr val="DEA036"/>
-                    </a:solidFill>
-                  </a:tcPr>
-                </a:tc>
-                <a:tc>
-                  <a:txBody>
-                    <a:bodyPr/>
-                    <a:lstStyle/>
-                    <a:p>
-                      <a:pPr defTabSz="914400">
-                        <a:defRPr sz="3600">
-                          <a:latin typeface="Helvetica Light"/>
-                          <a:ea typeface="Helvetica Light"/>
-                          <a:cs typeface="Helvetica Light"/>
-                        </a:defRPr>
-                      </a:pPr>
-                      <a:endParaRPr sz="400" dirty="0">
-                        <a:latin typeface="Wingdings" panose="05000000000000000000" pitchFamily="2" charset="2"/>
-                      </a:endParaRPr>
-                    </a:p>
-                  </a:txBody>
-                  <a:tcPr marL="0" marR="0" marT="0" marB="0" anchor="ctr" horzOverflow="overflow">
-                    <a:solidFill>
-                      <a:srgbClr val="DEA036"/>
-                    </a:solidFill>
-                  </a:tcPr>
-                </a:tc>
-                <a:tc>
-                  <a:txBody>
-                    <a:bodyPr/>
-                    <a:lstStyle/>
-                    <a:p>
-                      <a:pPr defTabSz="914400">
-                        <a:defRPr sz="3600">
-                          <a:latin typeface="Helvetica Light"/>
-                          <a:ea typeface="Helvetica Light"/>
-                          <a:cs typeface="Helvetica Light"/>
-                        </a:defRPr>
-                      </a:pPr>
-                      <a:endParaRPr sz="400" dirty="0">
-                        <a:latin typeface="Wingdings" panose="05000000000000000000" pitchFamily="2" charset="2"/>
-                      </a:endParaRPr>
-                    </a:p>
-                  </a:txBody>
-                  <a:tcPr marL="0" marR="0" marT="0" marB="0" anchor="ctr" horzOverflow="overflow">
-                    <a:solidFill>
-                      <a:srgbClr val="DEA036"/>
-                    </a:solidFill>
-                  </a:tcPr>
-                </a:tc>
-                <a:tc>
-                  <a:txBody>
-                    <a:bodyPr/>
-                    <a:lstStyle/>
-                    <a:p>
-                      <a:pPr marL="0" marR="0" lvl="0" indent="0" algn="l" defTabSz="914400" rtl="0" eaLnBrk="1" fontAlgn="auto" latinLnBrk="0" hangingPunct="1">
-                        <a:lnSpc>
-                          <a:spcPct val="100000"/>
-                        </a:lnSpc>
-                        <a:spcBef>
-                          <a:spcPts val="0"/>
-                        </a:spcBef>
-                        <a:spcAft>
-                          <a:spcPts val="0"/>
-                        </a:spcAft>
-                        <a:buClrTx/>
-                        <a:buSzTx/>
-                        <a:buFontTx/>
-                        <a:buNone/>
-                        <a:tabLst/>
-                        <a:defRPr sz="3600">
-                          <a:latin typeface="Helvetica Light"/>
-                          <a:ea typeface="Helvetica Light"/>
-                          <a:cs typeface="Helvetica Light"/>
-                        </a:defRPr>
-                      </a:pPr>
-                      <a:r>
-                        <a:rPr lang="fr-FR" sz="400" dirty="0">
-                          <a:latin typeface="Wingdings 3" panose="05040102010807070707" pitchFamily="18" charset="2"/>
-                        </a:rPr>
-                        <a:t>³</a:t>
-                      </a:r>
-                    </a:p>
-                  </a:txBody>
-                  <a:tcPr marL="0" marR="0" marT="0" marB="0" anchor="ctr" horzOverflow="overflow">
-                    <a:solidFill>
-                      <a:schemeClr val="bg1"/>
-                    </a:solidFill>
-                  </a:tcPr>
-                </a:tc>
-                <a:extLst>
-                  <a:ext uri="{0D108BD9-81ED-4DB2-BD59-A6C34878D82A}">
-                    <a16:rowId xmlns:a16="http://schemas.microsoft.com/office/drawing/2014/main" val="10003"/>
-                  </a:ext>
-                </a:extLst>
-              </a:tr>
-            </a:tbl>
-          </a:graphicData>
-        </a:graphic>
-      </p:graphicFrame>
       <p:graphicFrame>
         <p:nvGraphicFramePr>
           <p:cNvPr id="74" name="Table">
@@ -10675,13 +10326,13 @@
           <p:nvPr>
             <p:extLst>
               <p:ext uri="{D42A27DB-BD31-4B8C-83A1-F6EECF244321}">
-                <p14:modId xmlns:p14="http://schemas.microsoft.com/office/powerpoint/2010/main" val="3209473459"/>
+                <p14:modId xmlns:p14="http://schemas.microsoft.com/office/powerpoint/2010/main" val="2950097766"/>
               </p:ext>
             </p:extLst>
           </p:nvPr>
         </p:nvGraphicFramePr>
         <p:xfrm>
-          <a:off x="4982063" y="8811491"/>
+          <a:off x="4775886" y="8186825"/>
           <a:ext cx="360000" cy="365760"/>
         </p:xfrm>
         <a:graphic>
@@ -11192,6 +10843,564 @@
           </a:graphicData>
         </a:graphic>
       </p:graphicFrame>
+      <p:graphicFrame>
+        <p:nvGraphicFramePr>
+          <p:cNvPr id="71" name="Table">
+            <a:extLst>
+              <a:ext uri="{FF2B5EF4-FFF2-40B4-BE49-F238E27FC236}">
+                <a16:creationId xmlns:a16="http://schemas.microsoft.com/office/drawing/2014/main" id="{0CE1D9D6-6A35-4A55-8DD5-DF33E5E43AE7}"/>
+              </a:ext>
+            </a:extLst>
+          </p:cNvPr>
+          <p:cNvGraphicFramePr/>
+          <p:nvPr>
+            <p:extLst>
+              <p:ext uri="{D42A27DB-BD31-4B8C-83A1-F6EECF244321}">
+                <p14:modId xmlns:p14="http://schemas.microsoft.com/office/powerpoint/2010/main" val="492507309"/>
+              </p:ext>
+            </p:extLst>
+          </p:nvPr>
+        </p:nvGraphicFramePr>
+        <p:xfrm>
+          <a:off x="4796799" y="3243164"/>
+          <a:ext cx="360000" cy="365760"/>
+        </p:xfrm>
+        <a:graphic>
+          <a:graphicData uri="http://schemas.openxmlformats.org/drawingml/2006/table">
+            <a:tbl>
+              <a:tblPr>
+                <a:tableStyleId>{33BA23B1-9221-436E-865A-0063620EA4FD}</a:tableStyleId>
+              </a:tblPr>
+              <a:tblGrid>
+                <a:gridCol w="90000">
+                  <a:extLst>
+                    <a:ext uri="{9D8B030D-6E8A-4147-A177-3AD203B41FA5}">
+                      <a16:colId xmlns:a16="http://schemas.microsoft.com/office/drawing/2014/main" val="20000"/>
+                    </a:ext>
+                  </a:extLst>
+                </a:gridCol>
+                <a:gridCol w="90000">
+                  <a:extLst>
+                    <a:ext uri="{9D8B030D-6E8A-4147-A177-3AD203B41FA5}">
+                      <a16:colId xmlns:a16="http://schemas.microsoft.com/office/drawing/2014/main" val="20001"/>
+                    </a:ext>
+                  </a:extLst>
+                </a:gridCol>
+                <a:gridCol w="90000">
+                  <a:extLst>
+                    <a:ext uri="{9D8B030D-6E8A-4147-A177-3AD203B41FA5}">
+                      <a16:colId xmlns:a16="http://schemas.microsoft.com/office/drawing/2014/main" val="20002"/>
+                    </a:ext>
+                  </a:extLst>
+                </a:gridCol>
+                <a:gridCol w="90000">
+                  <a:extLst>
+                    <a:ext uri="{9D8B030D-6E8A-4147-A177-3AD203B41FA5}">
+                      <a16:colId xmlns:a16="http://schemas.microsoft.com/office/drawing/2014/main" val="1347651227"/>
+                    </a:ext>
+                  </a:extLst>
+                </a:gridCol>
+              </a:tblGrid>
+              <a:tr h="72000">
+                <a:tc>
+                  <a:txBody>
+                    <a:bodyPr/>
+                    <a:lstStyle/>
+                    <a:p>
+                      <a:pPr defTabSz="914400">
+                        <a:defRPr b="0">
+                          <a:solidFill>
+                            <a:srgbClr val="000000"/>
+                          </a:solidFill>
+                        </a:defRPr>
+                      </a:pPr>
+                      <a:endParaRPr lang="fr-FR" sz="600" b="0" dirty="0">
+                        <a:solidFill>
+                          <a:srgbClr val="FFFFFF"/>
+                        </a:solidFill>
+                        <a:latin typeface="Wingdings" panose="05000000000000000000" pitchFamily="2" charset="2"/>
+                        <a:ea typeface="Helvetica"/>
+                        <a:cs typeface="Helvetica"/>
+                        <a:sym typeface="Helvetica"/>
+                      </a:endParaRPr>
+                    </a:p>
+                  </a:txBody>
+                  <a:tcPr marL="0" marR="0" marT="0" marB="0" anchor="ctr" horzOverflow="overflow">
+                    <a:solidFill>
+                      <a:srgbClr val="A6AAA9"/>
+                    </a:solidFill>
+                  </a:tcPr>
+                </a:tc>
+                <a:tc>
+                  <a:txBody>
+                    <a:bodyPr/>
+                    <a:lstStyle/>
+                    <a:p>
+                      <a:pPr algn="l" defTabSz="914400">
+                        <a:defRPr b="0">
+                          <a:solidFill>
+                            <a:srgbClr val="000000"/>
+                          </a:solidFill>
+                        </a:defRPr>
+                      </a:pPr>
+                      <a:endParaRPr sz="600" b="0" dirty="0">
+                        <a:solidFill>
+                          <a:srgbClr val="FFFFFF"/>
+                        </a:solidFill>
+                        <a:latin typeface="Wingdings 3" panose="05040102010807070707" pitchFamily="18" charset="2"/>
+                        <a:ea typeface="Helvetica"/>
+                        <a:cs typeface="Helvetica"/>
+                        <a:sym typeface="Helvetica"/>
+                      </a:endParaRPr>
+                    </a:p>
+                  </a:txBody>
+                  <a:tcPr marL="0" marR="0" marT="0" marB="0" anchor="ctr" horzOverflow="overflow">
+                    <a:solidFill>
+                      <a:schemeClr val="bg1"/>
+                    </a:solidFill>
+                  </a:tcPr>
+                </a:tc>
+                <a:tc>
+                  <a:txBody>
+                    <a:bodyPr/>
+                    <a:lstStyle/>
+                    <a:p>
+                      <a:pPr defTabSz="914400">
+                        <a:defRPr b="0">
+                          <a:solidFill>
+                            <a:srgbClr val="000000"/>
+                          </a:solidFill>
+                        </a:defRPr>
+                      </a:pPr>
+                      <a:endParaRPr sz="600" b="0" dirty="0">
+                        <a:solidFill>
+                          <a:srgbClr val="FFFFFF"/>
+                        </a:solidFill>
+                        <a:latin typeface="Wingdings" panose="05000000000000000000" pitchFamily="2" charset="2"/>
+                        <a:ea typeface="Helvetica"/>
+                        <a:cs typeface="Helvetica"/>
+                        <a:sym typeface="Helvetica"/>
+                      </a:endParaRPr>
+                    </a:p>
+                  </a:txBody>
+                  <a:tcPr marL="0" marR="0" marT="0" marB="0" anchor="ctr" horzOverflow="overflow">
+                    <a:solidFill>
+                      <a:schemeClr val="bg1"/>
+                    </a:solidFill>
+                  </a:tcPr>
+                </a:tc>
+                <a:tc>
+                  <a:txBody>
+                    <a:bodyPr/>
+                    <a:lstStyle/>
+                    <a:p>
+                      <a:pPr algn="l" defTabSz="914400">
+                        <a:defRPr b="0">
+                          <a:solidFill>
+                            <a:srgbClr val="000000"/>
+                          </a:solidFill>
+                        </a:defRPr>
+                      </a:pPr>
+                      <a:endParaRPr sz="600" b="0" dirty="0">
+                        <a:solidFill>
+                          <a:srgbClr val="FFFFFF"/>
+                        </a:solidFill>
+                        <a:latin typeface="Wingdings 3" panose="05040102010807070707" pitchFamily="18" charset="2"/>
+                        <a:ea typeface="Helvetica"/>
+                        <a:cs typeface="Helvetica"/>
+                        <a:sym typeface="Helvetica"/>
+                      </a:endParaRPr>
+                    </a:p>
+                  </a:txBody>
+                  <a:tcPr marL="0" marR="0" marT="0" marB="0" anchor="ctr" horzOverflow="overflow">
+                    <a:solidFill>
+                      <a:schemeClr val="bg1"/>
+                    </a:solidFill>
+                  </a:tcPr>
+                </a:tc>
+                <a:extLst>
+                  <a:ext uri="{0D108BD9-81ED-4DB2-BD59-A6C34878D82A}">
+                    <a16:rowId xmlns:a16="http://schemas.microsoft.com/office/drawing/2014/main" val="10000"/>
+                  </a:ext>
+                </a:extLst>
+              </a:tr>
+              <a:tr h="72000">
+                <a:tc>
+                  <a:txBody>
+                    <a:bodyPr/>
+                    <a:lstStyle/>
+                    <a:p>
+                      <a:pPr defTabSz="914400">
+                        <a:defRPr sz="3600">
+                          <a:latin typeface="Helvetica"/>
+                          <a:ea typeface="Helvetica"/>
+                          <a:cs typeface="Helvetica"/>
+                          <a:sym typeface="Helvetica"/>
+                        </a:defRPr>
+                      </a:pPr>
+                      <a:endParaRPr sz="600" dirty="0">
+                        <a:latin typeface="Wingdings" panose="05000000000000000000" pitchFamily="2" charset="2"/>
+                      </a:endParaRPr>
+                    </a:p>
+                  </a:txBody>
+                  <a:tcPr marL="0" marR="0" marT="0" marB="0" anchor="ctr" horzOverflow="overflow">
+                    <a:solidFill>
+                      <a:srgbClr val="FCDB9F"/>
+                    </a:solidFill>
+                  </a:tcPr>
+                </a:tc>
+                <a:tc>
+                  <a:txBody>
+                    <a:bodyPr/>
+                    <a:lstStyle/>
+                    <a:p>
+                      <a:pPr algn="l" defTabSz="914400">
+                        <a:defRPr sz="3600">
+                          <a:latin typeface="Helvetica"/>
+                          <a:ea typeface="Helvetica"/>
+                          <a:cs typeface="Helvetica"/>
+                          <a:sym typeface="Helvetica"/>
+                        </a:defRPr>
+                      </a:pPr>
+                      <a:r>
+                        <a:rPr lang="fr-FR" sz="600" dirty="0">
+                          <a:latin typeface="Wingdings 3" panose="05040102010807070707" pitchFamily="18" charset="2"/>
+                        </a:rPr>
+                        <a:t>³</a:t>
+                      </a:r>
+                      <a:endParaRPr sz="600" dirty="0">
+                        <a:latin typeface="Wingdings 3" panose="05040102010807070707" pitchFamily="18" charset="2"/>
+                      </a:endParaRPr>
+                    </a:p>
+                  </a:txBody>
+                  <a:tcPr marL="0" marR="0" marT="0" marB="0" anchor="ctr" horzOverflow="overflow">
+                    <a:solidFill>
+                      <a:schemeClr val="bg1"/>
+                    </a:solidFill>
+                  </a:tcPr>
+                </a:tc>
+                <a:tc>
+                  <a:txBody>
+                    <a:bodyPr/>
+                    <a:lstStyle/>
+                    <a:p>
+                      <a:pPr defTabSz="914400">
+                        <a:defRPr sz="3600">
+                          <a:latin typeface="Helvetica"/>
+                          <a:ea typeface="Helvetica"/>
+                          <a:cs typeface="Helvetica"/>
+                          <a:sym typeface="Helvetica"/>
+                        </a:defRPr>
+                      </a:pPr>
+                      <a:endParaRPr sz="600" dirty="0">
+                        <a:latin typeface="Wingdings" panose="05000000000000000000" pitchFamily="2" charset="2"/>
+                      </a:endParaRPr>
+                    </a:p>
+                  </a:txBody>
+                  <a:tcPr marL="0" marR="0" marT="0" marB="0" anchor="ctr" horzOverflow="overflow">
+                    <a:solidFill>
+                      <a:schemeClr val="bg1"/>
+                    </a:solidFill>
+                  </a:tcPr>
+                </a:tc>
+                <a:tc>
+                  <a:txBody>
+                    <a:bodyPr/>
+                    <a:lstStyle/>
+                    <a:p>
+                      <a:pPr algn="l" defTabSz="914400">
+                        <a:defRPr sz="3600">
+                          <a:latin typeface="Helvetica"/>
+                          <a:ea typeface="Helvetica"/>
+                          <a:cs typeface="Helvetica"/>
+                          <a:sym typeface="Helvetica"/>
+                        </a:defRPr>
+                      </a:pPr>
+                      <a:endParaRPr sz="600" dirty="0">
+                        <a:latin typeface="Wingdings 3" panose="05040102010807070707" pitchFamily="18" charset="2"/>
+                      </a:endParaRPr>
+                    </a:p>
+                  </a:txBody>
+                  <a:tcPr marL="0" marR="0" marT="0" marB="0" anchor="ctr" horzOverflow="overflow">
+                    <a:solidFill>
+                      <a:schemeClr val="bg1"/>
+                    </a:solidFill>
+                  </a:tcPr>
+                </a:tc>
+                <a:extLst>
+                  <a:ext uri="{0D108BD9-81ED-4DB2-BD59-A6C34878D82A}">
+                    <a16:rowId xmlns:a16="http://schemas.microsoft.com/office/drawing/2014/main" val="10001"/>
+                  </a:ext>
+                </a:extLst>
+              </a:tr>
+              <a:tr h="72000">
+                <a:tc>
+                  <a:txBody>
+                    <a:bodyPr/>
+                    <a:lstStyle/>
+                    <a:p>
+                      <a:pPr defTabSz="914400">
+                        <a:defRPr sz="1000">
+                          <a:latin typeface="Helvetica"/>
+                          <a:ea typeface="Helvetica"/>
+                          <a:cs typeface="Helvetica"/>
+                          <a:sym typeface="Helvetica"/>
+                        </a:defRPr>
+                      </a:pPr>
+                      <a:endParaRPr sz="600" dirty="0">
+                        <a:latin typeface="Wingdings" panose="05000000000000000000" pitchFamily="2" charset="2"/>
+                      </a:endParaRPr>
+                    </a:p>
+                  </a:txBody>
+                  <a:tcPr marL="0" marR="0" marT="0" marB="0" anchor="ctr" horzOverflow="overflow">
+                    <a:solidFill>
+                      <a:srgbClr val="FABF53"/>
+                    </a:solidFill>
+                  </a:tcPr>
+                </a:tc>
+                <a:tc>
+                  <a:txBody>
+                    <a:bodyPr/>
+                    <a:lstStyle/>
+                    <a:p>
+                      <a:pPr marL="0" marR="0" lvl="0" indent="0" algn="l" defTabSz="914400" rtl="0" eaLnBrk="1" fontAlgn="auto" latinLnBrk="0" hangingPunct="1">
+                        <a:lnSpc>
+                          <a:spcPct val="100000"/>
+                        </a:lnSpc>
+                        <a:spcBef>
+                          <a:spcPts val="0"/>
+                        </a:spcBef>
+                        <a:spcAft>
+                          <a:spcPts val="0"/>
+                        </a:spcAft>
+                        <a:buClrTx/>
+                        <a:buSzTx/>
+                        <a:buFontTx/>
+                        <a:buNone/>
+                        <a:tabLst/>
+                        <a:defRPr sz="1000">
+                          <a:latin typeface="Helvetica"/>
+                          <a:ea typeface="Helvetica"/>
+                          <a:cs typeface="Helvetica"/>
+                          <a:sym typeface="Helvetica"/>
+                        </a:defRPr>
+                      </a:pPr>
+                      <a:r>
+                        <a:rPr lang="fr-FR" sz="600" dirty="0">
+                          <a:latin typeface="Wingdings 3" panose="05040102010807070707" pitchFamily="18" charset="2"/>
+                        </a:rPr>
+                        <a:t>³</a:t>
+                      </a:r>
+                    </a:p>
+                  </a:txBody>
+                  <a:tcPr marL="0" marR="0" marT="0" marB="0" anchor="ctr" horzOverflow="overflow">
+                    <a:solidFill>
+                      <a:schemeClr val="bg1"/>
+                    </a:solidFill>
+                  </a:tcPr>
+                </a:tc>
+                <a:tc>
+                  <a:txBody>
+                    <a:bodyPr/>
+                    <a:lstStyle/>
+                    <a:p>
+                      <a:pPr defTabSz="914400">
+                        <a:defRPr sz="1000">
+                          <a:latin typeface="Helvetica"/>
+                          <a:ea typeface="Helvetica"/>
+                          <a:cs typeface="Helvetica"/>
+                          <a:sym typeface="Helvetica"/>
+                        </a:defRPr>
+                      </a:pPr>
+                      <a:endParaRPr sz="600" dirty="0">
+                        <a:latin typeface="Wingdings" panose="05000000000000000000" pitchFamily="2" charset="2"/>
+                      </a:endParaRPr>
+                    </a:p>
+                  </a:txBody>
+                  <a:tcPr marL="0" marR="0" marT="0" marB="0" anchor="ctr" horzOverflow="overflow">
+                    <a:solidFill>
+                      <a:schemeClr val="bg1"/>
+                    </a:solidFill>
+                  </a:tcPr>
+                </a:tc>
+                <a:tc>
+                  <a:txBody>
+                    <a:bodyPr/>
+                    <a:lstStyle/>
+                    <a:p>
+                      <a:pPr marL="0" marR="0" lvl="0" indent="0" algn="l" defTabSz="914400" rtl="0" eaLnBrk="1" fontAlgn="auto" latinLnBrk="0" hangingPunct="1">
+                        <a:lnSpc>
+                          <a:spcPct val="100000"/>
+                        </a:lnSpc>
+                        <a:spcBef>
+                          <a:spcPts val="0"/>
+                        </a:spcBef>
+                        <a:spcAft>
+                          <a:spcPts val="0"/>
+                        </a:spcAft>
+                        <a:buClrTx/>
+                        <a:buSzTx/>
+                        <a:buFontTx/>
+                        <a:buNone/>
+                        <a:tabLst/>
+                        <a:defRPr sz="1000">
+                          <a:latin typeface="Helvetica"/>
+                          <a:ea typeface="Helvetica"/>
+                          <a:cs typeface="Helvetica"/>
+                          <a:sym typeface="Helvetica"/>
+                        </a:defRPr>
+                      </a:pPr>
+                      <a:endParaRPr lang="fr-FR" sz="600" dirty="0">
+                        <a:latin typeface="Wingdings 3" panose="05040102010807070707" pitchFamily="18" charset="2"/>
+                      </a:endParaRPr>
+                    </a:p>
+                  </a:txBody>
+                  <a:tcPr marL="0" marR="0" marT="0" marB="0" anchor="ctr" horzOverflow="overflow">
+                    <a:solidFill>
+                      <a:schemeClr val="bg1"/>
+                    </a:solidFill>
+                  </a:tcPr>
+                </a:tc>
+                <a:extLst>
+                  <a:ext uri="{0D108BD9-81ED-4DB2-BD59-A6C34878D82A}">
+                    <a16:rowId xmlns:a16="http://schemas.microsoft.com/office/drawing/2014/main" val="10002"/>
+                  </a:ext>
+                </a:extLst>
+              </a:tr>
+              <a:tr h="72000">
+                <a:tc>
+                  <a:txBody>
+                    <a:bodyPr/>
+                    <a:lstStyle/>
+                    <a:p>
+                      <a:pPr defTabSz="914400">
+                        <a:defRPr sz="3600">
+                          <a:latin typeface="Helvetica Light"/>
+                          <a:ea typeface="Helvetica Light"/>
+                          <a:cs typeface="Helvetica Light"/>
+                        </a:defRPr>
+                      </a:pPr>
+                      <a:endParaRPr sz="600" dirty="0">
+                        <a:latin typeface="Wingdings" panose="05000000000000000000" pitchFamily="2" charset="2"/>
+                      </a:endParaRPr>
+                    </a:p>
+                  </a:txBody>
+                  <a:tcPr marL="0" marR="0" marT="0" marB="0" anchor="ctr" horzOverflow="overflow">
+                    <a:solidFill>
+                      <a:srgbClr val="DEA036"/>
+                    </a:solidFill>
+                  </a:tcPr>
+                </a:tc>
+                <a:tc>
+                  <a:txBody>
+                    <a:bodyPr/>
+                    <a:lstStyle/>
+                    <a:p>
+                      <a:pPr marL="0" marR="0" lvl="0" indent="0" algn="l" defTabSz="914400" rtl="0" eaLnBrk="1" fontAlgn="auto" latinLnBrk="0" hangingPunct="1">
+                        <a:lnSpc>
+                          <a:spcPct val="100000"/>
+                        </a:lnSpc>
+                        <a:spcBef>
+                          <a:spcPts val="0"/>
+                        </a:spcBef>
+                        <a:spcAft>
+                          <a:spcPts val="0"/>
+                        </a:spcAft>
+                        <a:buClrTx/>
+                        <a:buSzTx/>
+                        <a:buFontTx/>
+                        <a:buNone/>
+                        <a:tabLst/>
+                        <a:defRPr sz="3600">
+                          <a:latin typeface="Helvetica Light"/>
+                          <a:ea typeface="Helvetica Light"/>
+                          <a:cs typeface="Helvetica Light"/>
+                        </a:defRPr>
+                      </a:pPr>
+                      <a:r>
+                        <a:rPr lang="fr-FR" sz="600" dirty="0">
+                          <a:latin typeface="Wingdings 3" panose="05040102010807070707" pitchFamily="18" charset="2"/>
+                        </a:rPr>
+                        <a:t>³</a:t>
+                      </a:r>
+                    </a:p>
+                  </a:txBody>
+                  <a:tcPr marL="0" marR="0" marT="0" marB="0" anchor="ctr" horzOverflow="overflow">
+                    <a:solidFill>
+                      <a:schemeClr val="bg1"/>
+                    </a:solidFill>
+                  </a:tcPr>
+                </a:tc>
+                <a:tc>
+                  <a:txBody>
+                    <a:bodyPr/>
+                    <a:lstStyle/>
+                    <a:p>
+                      <a:pPr defTabSz="914400">
+                        <a:defRPr sz="3600">
+                          <a:latin typeface="Helvetica Light"/>
+                          <a:ea typeface="Helvetica Light"/>
+                          <a:cs typeface="Helvetica Light"/>
+                        </a:defRPr>
+                      </a:pPr>
+                      <a:endParaRPr sz="600" dirty="0">
+                        <a:latin typeface="Wingdings" panose="05000000000000000000" pitchFamily="2" charset="2"/>
+                      </a:endParaRPr>
+                    </a:p>
+                  </a:txBody>
+                  <a:tcPr marL="0" marR="0" marT="0" marB="0" anchor="ctr" horzOverflow="overflow">
+                    <a:solidFill>
+                      <a:schemeClr val="bg1"/>
+                    </a:solidFill>
+                  </a:tcPr>
+                </a:tc>
+                <a:tc>
+                  <a:txBody>
+                    <a:bodyPr/>
+                    <a:lstStyle/>
+                    <a:p>
+                      <a:pPr marL="0" marR="0" lvl="0" indent="0" algn="l" defTabSz="914400" rtl="0" eaLnBrk="1" fontAlgn="auto" latinLnBrk="0" hangingPunct="1">
+                        <a:lnSpc>
+                          <a:spcPct val="100000"/>
+                        </a:lnSpc>
+                        <a:spcBef>
+                          <a:spcPts val="0"/>
+                        </a:spcBef>
+                        <a:spcAft>
+                          <a:spcPts val="0"/>
+                        </a:spcAft>
+                        <a:buClrTx/>
+                        <a:buSzTx/>
+                        <a:buFontTx/>
+                        <a:buNone/>
+                        <a:tabLst/>
+                        <a:defRPr sz="3600">
+                          <a:latin typeface="Helvetica Light"/>
+                          <a:ea typeface="Helvetica Light"/>
+                          <a:cs typeface="Helvetica Light"/>
+                        </a:defRPr>
+                      </a:pPr>
+                      <a:endParaRPr lang="fr-FR" sz="600" dirty="0">
+                        <a:latin typeface="Wingdings 3" panose="05040102010807070707" pitchFamily="18" charset="2"/>
+                      </a:endParaRPr>
+                    </a:p>
+                  </a:txBody>
+                  <a:tcPr marL="0" marR="0" marT="0" marB="0" anchor="ctr" horzOverflow="overflow">
+                    <a:solidFill>
+                      <a:schemeClr val="bg1"/>
+                    </a:solidFill>
+                  </a:tcPr>
+                </a:tc>
+                <a:extLst>
+                  <a:ext uri="{0D108BD9-81ED-4DB2-BD59-A6C34878D82A}">
+                    <a16:rowId xmlns:a16="http://schemas.microsoft.com/office/drawing/2014/main" val="10003"/>
+                  </a:ext>
+                </a:extLst>
+              </a:tr>
+            </a:tbl>
+          </a:graphicData>
+        </a:graphic>
+      </p:graphicFrame>
     </p:spTree>
   </p:cSld>
   <p:clrMapOvr>
@@ -12035,9 +12244,7 @@
             <p:nvPr/>
           </p:nvPicPr>
           <p:blipFill>
-            <a:blip r:embed="rId2">
-              <a:extLst/>
-            </a:blip>
+            <a:blip r:embed="rId2"/>
             <a:stretch>
               <a:fillRect/>
             </a:stretch>
@@ -12124,7 +12331,7 @@
           </a:ln>
           <a:extLst>
             <a:ext uri="{C572A759-6A51-4108-AA02-DFA0A04FC94B}">
-              <ma14:wrappingTextBoxFlag xmlns:ma14="http://schemas.microsoft.com/office/mac/drawingml/2011/main" xmlns:a14="http://schemas.microsoft.com/office/drawing/2010/main" xmlns:m="http://schemas.openxmlformats.org/officeDocument/2006/math" xmlns="" val="1"/>
+              <ma14:wrappingTextBoxFlag xmlns="" xmlns:m="http://schemas.openxmlformats.org/officeDocument/2006/math" xmlns:a14="http://schemas.microsoft.com/office/drawing/2010/main" xmlns:ma14="http://schemas.microsoft.com/office/mac/drawingml/2011/main" val="1"/>
             </a:ext>
           </a:extLst>
         </p:spPr>
@@ -12197,7 +12404,7 @@
           </a:ln>
           <a:extLst>
             <a:ext uri="{C572A759-6A51-4108-AA02-DFA0A04FC94B}">
-              <ma14:wrappingTextBoxFlag xmlns:ma14="http://schemas.microsoft.com/office/mac/drawingml/2011/main" xmlns:a14="http://schemas.microsoft.com/office/drawing/2010/main" xmlns:m="http://schemas.openxmlformats.org/officeDocument/2006/math" xmlns="" val="1"/>
+              <ma14:wrappingTextBoxFlag xmlns="" xmlns:m="http://schemas.openxmlformats.org/officeDocument/2006/math" xmlns:a14="http://schemas.microsoft.com/office/drawing/2010/main" xmlns:ma14="http://schemas.microsoft.com/office/mac/drawingml/2011/main" val="1"/>
             </a:ext>
           </a:extLst>
         </p:spPr>
@@ -12328,7 +12535,7 @@
           </a:ln>
           <a:extLst>
             <a:ext uri="{C572A759-6A51-4108-AA02-DFA0A04FC94B}">
-              <ma14:wrappingTextBoxFlag xmlns:ma14="http://schemas.microsoft.com/office/mac/drawingml/2011/main" xmlns:a14="http://schemas.microsoft.com/office/drawing/2010/main" xmlns:m="http://schemas.openxmlformats.org/officeDocument/2006/math" xmlns="" val="1"/>
+              <ma14:wrappingTextBoxFlag xmlns="" xmlns:m="http://schemas.openxmlformats.org/officeDocument/2006/math" xmlns:a14="http://schemas.microsoft.com/office/drawing/2010/main" xmlns:ma14="http://schemas.microsoft.com/office/mac/drawingml/2011/main" val="1"/>
             </a:ext>
           </a:extLst>
         </p:spPr>
@@ -12490,7 +12697,7 @@
           </a:ln>
           <a:extLst>
             <a:ext uri="{C572A759-6A51-4108-AA02-DFA0A04FC94B}">
-              <ma14:wrappingTextBoxFlag xmlns:ma14="http://schemas.microsoft.com/office/mac/drawingml/2011/main" xmlns:a14="http://schemas.microsoft.com/office/drawing/2010/main" xmlns:m="http://schemas.openxmlformats.org/officeDocument/2006/math" xmlns="" val="1"/>
+              <ma14:wrappingTextBoxFlag xmlns="" xmlns:m="http://schemas.openxmlformats.org/officeDocument/2006/math" xmlns:a14="http://schemas.microsoft.com/office/drawing/2010/main" xmlns:ma14="http://schemas.microsoft.com/office/mac/drawingml/2011/main" val="1"/>
             </a:ext>
           </a:extLst>
         </p:spPr>
@@ -12545,7 +12752,7 @@
           </a:ln>
           <a:extLst>
             <a:ext uri="{C572A759-6A51-4108-AA02-DFA0A04FC94B}">
-              <ma14:wrappingTextBoxFlag xmlns:ma14="http://schemas.microsoft.com/office/mac/drawingml/2011/main" xmlns:a14="http://schemas.microsoft.com/office/drawing/2010/main" xmlns:m="http://schemas.openxmlformats.org/officeDocument/2006/math" xmlns="" val="1"/>
+              <ma14:wrappingTextBoxFlag xmlns="" xmlns:m="http://schemas.openxmlformats.org/officeDocument/2006/math" xmlns:a14="http://schemas.microsoft.com/office/drawing/2010/main" xmlns:ma14="http://schemas.microsoft.com/office/mac/drawingml/2011/main" val="1"/>
             </a:ext>
           </a:extLst>
         </p:spPr>
@@ -12604,7 +12811,7 @@
           </a:ln>
           <a:extLst>
             <a:ext uri="{C572A759-6A51-4108-AA02-DFA0A04FC94B}">
-              <ma14:wrappingTextBoxFlag xmlns:ma14="http://schemas.microsoft.com/office/mac/drawingml/2011/main" xmlns:a14="http://schemas.microsoft.com/office/drawing/2010/main" xmlns:m="http://schemas.openxmlformats.org/officeDocument/2006/math" xmlns="" val="1"/>
+              <ma14:wrappingTextBoxFlag xmlns="" xmlns:m="http://schemas.openxmlformats.org/officeDocument/2006/math" xmlns:a14="http://schemas.microsoft.com/office/drawing/2010/main" xmlns:ma14="http://schemas.microsoft.com/office/mac/drawingml/2011/main" val="1"/>
             </a:ext>
           </a:extLst>
         </p:spPr>
@@ -12672,9 +12879,7 @@
             <p:nvPr/>
           </p:nvPicPr>
           <p:blipFill>
-            <a:blip r:embed="rId6">
-              <a:extLst/>
-            </a:blip>
+            <a:blip r:embed="rId6"/>
             <a:stretch>
               <a:fillRect/>
             </a:stretch>
@@ -12716,7 +12921,7 @@
             <a:effectLst/>
             <a:extLst>
               <a:ext uri="{C572A759-6A51-4108-AA02-DFA0A04FC94B}">
-                <ma14:wrappingTextBoxFlag xmlns:ma14="http://schemas.microsoft.com/office/mac/drawingml/2011/main" xmlns:a14="http://schemas.microsoft.com/office/drawing/2010/main" xmlns:m="http://schemas.openxmlformats.org/officeDocument/2006/math" xmlns="" val="1"/>
+                <ma14:wrappingTextBoxFlag xmlns="" xmlns:m="http://schemas.openxmlformats.org/officeDocument/2006/math" xmlns:a14="http://schemas.microsoft.com/office/drawing/2010/main" xmlns:ma14="http://schemas.microsoft.com/office/mac/drawingml/2011/main" val="1"/>
               </a:ext>
             </a:extLst>
           </p:spPr>
@@ -12766,7 +12971,7 @@
           </a:ln>
           <a:extLst>
             <a:ext uri="{C572A759-6A51-4108-AA02-DFA0A04FC94B}">
-              <ma14:wrappingTextBoxFlag xmlns:ma14="http://schemas.microsoft.com/office/mac/drawingml/2011/main" xmlns:a14="http://schemas.microsoft.com/office/drawing/2010/main" xmlns:m="http://schemas.openxmlformats.org/officeDocument/2006/math" xmlns="" val="1"/>
+              <ma14:wrappingTextBoxFlag xmlns="" xmlns:m="http://schemas.openxmlformats.org/officeDocument/2006/math" xmlns:a14="http://schemas.microsoft.com/office/drawing/2010/main" xmlns:ma14="http://schemas.microsoft.com/office/mac/drawingml/2011/main" val="1"/>
             </a:ext>
           </a:extLst>
         </p:spPr>
@@ -12826,7 +13031,7 @@
           </a:ln>
           <a:extLst>
             <a:ext uri="{C572A759-6A51-4108-AA02-DFA0A04FC94B}">
-              <ma14:wrappingTextBoxFlag xmlns:ma14="http://schemas.microsoft.com/office/mac/drawingml/2011/main" xmlns:a14="http://schemas.microsoft.com/office/drawing/2010/main" xmlns:m="http://schemas.openxmlformats.org/officeDocument/2006/math" xmlns="" val="1"/>
+              <ma14:wrappingTextBoxFlag xmlns="" xmlns:m="http://schemas.openxmlformats.org/officeDocument/2006/math" xmlns:a14="http://schemas.microsoft.com/office/drawing/2010/main" xmlns:ma14="http://schemas.microsoft.com/office/mac/drawingml/2011/main" val="1"/>
             </a:ext>
           </a:extLst>
         </p:spPr>
@@ -12886,7 +13091,7 @@
           </a:ln>
           <a:extLst>
             <a:ext uri="{C572A759-6A51-4108-AA02-DFA0A04FC94B}">
-              <ma14:wrappingTextBoxFlag xmlns:ma14="http://schemas.microsoft.com/office/mac/drawingml/2011/main" xmlns:a14="http://schemas.microsoft.com/office/drawing/2010/main" xmlns:m="http://schemas.openxmlformats.org/officeDocument/2006/math" xmlns="" val="1"/>
+              <ma14:wrappingTextBoxFlag xmlns="" xmlns:m="http://schemas.openxmlformats.org/officeDocument/2006/math" xmlns:a14="http://schemas.microsoft.com/office/drawing/2010/main" xmlns:ma14="http://schemas.microsoft.com/office/mac/drawingml/2011/main" val="1"/>
             </a:ext>
           </a:extLst>
         </p:spPr>
@@ -12946,7 +13151,7 @@
           </a:ln>
           <a:extLst>
             <a:ext uri="{C572A759-6A51-4108-AA02-DFA0A04FC94B}">
-              <ma14:wrappingTextBoxFlag xmlns:ma14="http://schemas.microsoft.com/office/mac/drawingml/2011/main" xmlns:a14="http://schemas.microsoft.com/office/drawing/2010/main" xmlns:m="http://schemas.openxmlformats.org/officeDocument/2006/math" xmlns="" val="1"/>
+              <ma14:wrappingTextBoxFlag xmlns="" xmlns:m="http://schemas.openxmlformats.org/officeDocument/2006/math" xmlns:a14="http://schemas.microsoft.com/office/drawing/2010/main" xmlns:ma14="http://schemas.microsoft.com/office/mac/drawingml/2011/main" val="1"/>
             </a:ext>
           </a:extLst>
         </p:spPr>
@@ -13006,7 +13211,7 @@
           </a:ln>
           <a:extLst>
             <a:ext uri="{C572A759-6A51-4108-AA02-DFA0A04FC94B}">
-              <ma14:wrappingTextBoxFlag xmlns:ma14="http://schemas.microsoft.com/office/mac/drawingml/2011/main" xmlns:a14="http://schemas.microsoft.com/office/drawing/2010/main" xmlns:m="http://schemas.openxmlformats.org/officeDocument/2006/math" xmlns="" val="1"/>
+              <ma14:wrappingTextBoxFlag xmlns="" xmlns:m="http://schemas.openxmlformats.org/officeDocument/2006/math" xmlns:a14="http://schemas.microsoft.com/office/drawing/2010/main" xmlns:ma14="http://schemas.microsoft.com/office/mac/drawingml/2011/main" val="1"/>
             </a:ext>
           </a:extLst>
         </p:spPr>
@@ -13086,7 +13291,7 @@
           </a:ln>
           <a:extLst>
             <a:ext uri="{C572A759-6A51-4108-AA02-DFA0A04FC94B}">
-              <ma14:wrappingTextBoxFlag xmlns:ma14="http://schemas.microsoft.com/office/mac/drawingml/2011/main" xmlns:a14="http://schemas.microsoft.com/office/drawing/2010/main" xmlns:m="http://schemas.openxmlformats.org/officeDocument/2006/math" xmlns="" val="1"/>
+              <ma14:wrappingTextBoxFlag xmlns="" xmlns:m="http://schemas.openxmlformats.org/officeDocument/2006/math" xmlns:a14="http://schemas.microsoft.com/office/drawing/2010/main" xmlns:ma14="http://schemas.microsoft.com/office/mac/drawingml/2011/main" val="1"/>
             </a:ext>
           </a:extLst>
         </p:spPr>
@@ -13188,7 +13393,7 @@
             <a:effectLst/>
             <a:extLst>
               <a:ext uri="{C572A759-6A51-4108-AA02-DFA0A04FC94B}">
-                <ma14:wrappingTextBoxFlag xmlns:ma14="http://schemas.microsoft.com/office/mac/drawingml/2011/main" xmlns:a14="http://schemas.microsoft.com/office/drawing/2010/main" xmlns:m="http://schemas.openxmlformats.org/officeDocument/2006/math" xmlns="" val="1"/>
+                <ma14:wrappingTextBoxFlag xmlns="" xmlns:m="http://schemas.openxmlformats.org/officeDocument/2006/math" xmlns:a14="http://schemas.microsoft.com/office/drawing/2010/main" xmlns:ma14="http://schemas.microsoft.com/office/mac/drawingml/2011/main" val="1"/>
               </a:ext>
             </a:extLst>
           </p:spPr>
@@ -13275,7 +13480,7 @@
           </a:ln>
           <a:extLst>
             <a:ext uri="{C572A759-6A51-4108-AA02-DFA0A04FC94B}">
-              <ma14:wrappingTextBoxFlag xmlns:ma14="http://schemas.microsoft.com/office/mac/drawingml/2011/main" xmlns:a14="http://schemas.microsoft.com/office/drawing/2010/main" xmlns:m="http://schemas.openxmlformats.org/officeDocument/2006/math" xmlns="" val="1"/>
+              <ma14:wrappingTextBoxFlag xmlns="" xmlns:m="http://schemas.openxmlformats.org/officeDocument/2006/math" xmlns:a14="http://schemas.microsoft.com/office/drawing/2010/main" xmlns:ma14="http://schemas.microsoft.com/office/mac/drawingml/2011/main" val="1"/>
             </a:ext>
           </a:extLst>
         </p:spPr>
@@ -13352,7 +13557,7 @@
           </a:ln>
           <a:extLst>
             <a:ext uri="{C572A759-6A51-4108-AA02-DFA0A04FC94B}">
-              <ma14:wrappingTextBoxFlag xmlns:ma14="http://schemas.microsoft.com/office/mac/drawingml/2011/main" xmlns:a14="http://schemas.microsoft.com/office/drawing/2010/main" xmlns:m="http://schemas.openxmlformats.org/officeDocument/2006/math" xmlns="" val="1"/>
+              <ma14:wrappingTextBoxFlag xmlns="" xmlns:m="http://schemas.openxmlformats.org/officeDocument/2006/math" xmlns:a14="http://schemas.microsoft.com/office/drawing/2010/main" xmlns:ma14="http://schemas.microsoft.com/office/mac/drawingml/2011/main" val="1"/>
             </a:ext>
           </a:extLst>
         </p:spPr>
@@ -13429,7 +13634,7 @@
           </a:ln>
           <a:extLst>
             <a:ext uri="{C572A759-6A51-4108-AA02-DFA0A04FC94B}">
-              <ma14:wrappingTextBoxFlag xmlns:ma14="http://schemas.microsoft.com/office/mac/drawingml/2011/main" xmlns:a14="http://schemas.microsoft.com/office/drawing/2010/main" xmlns:m="http://schemas.openxmlformats.org/officeDocument/2006/math" xmlns="" val="1"/>
+              <ma14:wrappingTextBoxFlag xmlns="" xmlns:m="http://schemas.openxmlformats.org/officeDocument/2006/math" xmlns:a14="http://schemas.microsoft.com/office/drawing/2010/main" xmlns:ma14="http://schemas.microsoft.com/office/mac/drawingml/2011/main" val="1"/>
             </a:ext>
           </a:extLst>
         </p:spPr>
@@ -13663,7 +13868,7 @@
             <a:effectLst/>
             <a:extLst>
               <a:ext uri="{C572A759-6A51-4108-AA02-DFA0A04FC94B}">
-                <ma14:wrappingTextBoxFlag xmlns:ma14="http://schemas.microsoft.com/office/mac/drawingml/2011/main" xmlns:a14="http://schemas.microsoft.com/office/drawing/2010/main" xmlns:m="http://schemas.openxmlformats.org/officeDocument/2006/math" xmlns="" val="1"/>
+                <ma14:wrappingTextBoxFlag xmlns="" xmlns:m="http://schemas.openxmlformats.org/officeDocument/2006/math" xmlns:a14="http://schemas.microsoft.com/office/drawing/2010/main" xmlns:ma14="http://schemas.microsoft.com/office/mac/drawingml/2011/main" val="1"/>
               </a:ext>
             </a:extLst>
           </p:spPr>
@@ -13834,7 +14039,7 @@
             <a:effectLst/>
             <a:extLst>
               <a:ext uri="{C572A759-6A51-4108-AA02-DFA0A04FC94B}">
-                <ma14:wrappingTextBoxFlag xmlns:ma14="http://schemas.microsoft.com/office/mac/drawingml/2011/main" xmlns:a14="http://schemas.microsoft.com/office/drawing/2010/main" xmlns:m="http://schemas.openxmlformats.org/officeDocument/2006/math" xmlns="" val="1"/>
+                <ma14:wrappingTextBoxFlag xmlns="" xmlns:m="http://schemas.openxmlformats.org/officeDocument/2006/math" xmlns:a14="http://schemas.microsoft.com/office/drawing/2010/main" xmlns:ma14="http://schemas.microsoft.com/office/mac/drawingml/2011/main" val="1"/>
               </a:ext>
             </a:extLst>
           </p:spPr>
@@ -13948,7 +14153,7 @@
             <a:effectLst/>
             <a:extLst>
               <a:ext uri="{C572A759-6A51-4108-AA02-DFA0A04FC94B}">
-                <ma14:wrappingTextBoxFlag xmlns:ma14="http://schemas.microsoft.com/office/mac/drawingml/2011/main" xmlns:a14="http://schemas.microsoft.com/office/drawing/2010/main" xmlns:m="http://schemas.openxmlformats.org/officeDocument/2006/math" xmlns="" val="1"/>
+                <ma14:wrappingTextBoxFlag xmlns="" xmlns:m="http://schemas.openxmlformats.org/officeDocument/2006/math" xmlns:a14="http://schemas.microsoft.com/office/drawing/2010/main" xmlns:ma14="http://schemas.microsoft.com/office/mac/drawingml/2011/main" val="1"/>
               </a:ext>
             </a:extLst>
           </p:spPr>
@@ -14014,7 +14219,7 @@
             <a:effectLst/>
             <a:extLst>
               <a:ext uri="{C572A759-6A51-4108-AA02-DFA0A04FC94B}">
-                <ma14:wrappingTextBoxFlag xmlns:ma14="http://schemas.microsoft.com/office/mac/drawingml/2011/main" xmlns:a14="http://schemas.microsoft.com/office/drawing/2010/main" xmlns:m="http://schemas.openxmlformats.org/officeDocument/2006/math" xmlns="" val="1"/>
+                <ma14:wrappingTextBoxFlag xmlns="" xmlns:m="http://schemas.openxmlformats.org/officeDocument/2006/math" xmlns:a14="http://schemas.microsoft.com/office/drawing/2010/main" xmlns:ma14="http://schemas.microsoft.com/office/mac/drawingml/2011/main" val="1"/>
               </a:ext>
             </a:extLst>
           </p:spPr>
@@ -14110,7 +14315,7 @@
           </a:ln>
           <a:extLst>
             <a:ext uri="{C572A759-6A51-4108-AA02-DFA0A04FC94B}">
-              <ma14:wrappingTextBoxFlag xmlns:ma14="http://schemas.microsoft.com/office/mac/drawingml/2011/main" xmlns:a14="http://schemas.microsoft.com/office/drawing/2010/main" xmlns:m="http://schemas.openxmlformats.org/officeDocument/2006/math" xmlns="" val="1"/>
+              <ma14:wrappingTextBoxFlag xmlns="" xmlns:m="http://schemas.openxmlformats.org/officeDocument/2006/math" xmlns:a14="http://schemas.microsoft.com/office/drawing/2010/main" xmlns:ma14="http://schemas.microsoft.com/office/mac/drawingml/2011/main" val="1"/>
             </a:ext>
           </a:extLst>
         </p:spPr>
@@ -14147,7 +14352,7 @@
           </a:ln>
           <a:extLst>
             <a:ext uri="{C572A759-6A51-4108-AA02-DFA0A04FC94B}">
-              <ma14:wrappingTextBoxFlag xmlns:ma14="http://schemas.microsoft.com/office/mac/drawingml/2011/main" xmlns:a14="http://schemas.microsoft.com/office/drawing/2010/main" xmlns:m="http://schemas.openxmlformats.org/officeDocument/2006/math" xmlns="" val="1"/>
+              <ma14:wrappingTextBoxFlag xmlns="" xmlns:m="http://schemas.openxmlformats.org/officeDocument/2006/math" xmlns:a14="http://schemas.microsoft.com/office/drawing/2010/main" xmlns:ma14="http://schemas.microsoft.com/office/mac/drawingml/2011/main" val="1"/>
             </a:ext>
           </a:extLst>
         </p:spPr>
@@ -14237,7 +14442,7 @@
           </a:ln>
           <a:extLst>
             <a:ext uri="{C572A759-6A51-4108-AA02-DFA0A04FC94B}">
-              <ma14:wrappingTextBoxFlag xmlns:ma14="http://schemas.microsoft.com/office/mac/drawingml/2011/main" xmlns:a14="http://schemas.microsoft.com/office/drawing/2010/main" xmlns:m="http://schemas.openxmlformats.org/officeDocument/2006/math" xmlns="" val="1"/>
+              <ma14:wrappingTextBoxFlag xmlns="" xmlns:m="http://schemas.openxmlformats.org/officeDocument/2006/math" xmlns:a14="http://schemas.microsoft.com/office/drawing/2010/main" xmlns:ma14="http://schemas.microsoft.com/office/mac/drawingml/2011/main" val="1"/>
             </a:ext>
           </a:extLst>
         </p:spPr>
@@ -14327,7 +14532,7 @@
           </a:ln>
           <a:extLst>
             <a:ext uri="{C572A759-6A51-4108-AA02-DFA0A04FC94B}">
-              <ma14:wrappingTextBoxFlag xmlns:ma14="http://schemas.microsoft.com/office/mac/drawingml/2011/main" xmlns:a14="http://schemas.microsoft.com/office/drawing/2010/main" xmlns:m="http://schemas.openxmlformats.org/officeDocument/2006/math" xmlns="" val="1"/>
+              <ma14:wrappingTextBoxFlag xmlns="" xmlns:m="http://schemas.openxmlformats.org/officeDocument/2006/math" xmlns:a14="http://schemas.microsoft.com/office/drawing/2010/main" xmlns:ma14="http://schemas.microsoft.com/office/mac/drawingml/2011/main" val="1"/>
             </a:ext>
           </a:extLst>
         </p:spPr>
@@ -14417,7 +14622,7 @@
           </a:ln>
           <a:extLst>
             <a:ext uri="{C572A759-6A51-4108-AA02-DFA0A04FC94B}">
-              <ma14:wrappingTextBoxFlag xmlns:ma14="http://schemas.microsoft.com/office/mac/drawingml/2011/main" xmlns:a14="http://schemas.microsoft.com/office/drawing/2010/main" xmlns:m="http://schemas.openxmlformats.org/officeDocument/2006/math" xmlns="" val="1"/>
+              <ma14:wrappingTextBoxFlag xmlns="" xmlns:m="http://schemas.openxmlformats.org/officeDocument/2006/math" xmlns:a14="http://schemas.microsoft.com/office/drawing/2010/main" xmlns:ma14="http://schemas.microsoft.com/office/mac/drawingml/2011/main" val="1"/>
             </a:ext>
           </a:extLst>
         </p:spPr>
@@ -15024,7 +15229,7 @@
           </a:ln>
           <a:extLst>
             <a:ext uri="{C572A759-6A51-4108-AA02-DFA0A04FC94B}">
-              <ma14:wrappingTextBoxFlag xmlns:ma14="http://schemas.microsoft.com/office/mac/drawingml/2011/main" xmlns:a14="http://schemas.microsoft.com/office/drawing/2010/main" xmlns:m="http://schemas.openxmlformats.org/officeDocument/2006/math" xmlns="" val="1"/>
+              <ma14:wrappingTextBoxFlag xmlns="" xmlns:m="http://schemas.openxmlformats.org/officeDocument/2006/math" xmlns:a14="http://schemas.microsoft.com/office/drawing/2010/main" xmlns:ma14="http://schemas.microsoft.com/office/mac/drawingml/2011/main" val="1"/>
             </a:ext>
           </a:extLst>
         </p:spPr>
@@ -15075,7 +15280,7 @@
           </a:ln>
           <a:extLst>
             <a:ext uri="{C572A759-6A51-4108-AA02-DFA0A04FC94B}">
-              <ma14:wrappingTextBoxFlag xmlns:ma14="http://schemas.microsoft.com/office/mac/drawingml/2011/main" xmlns:a14="http://schemas.microsoft.com/office/drawing/2010/main" xmlns:m="http://schemas.openxmlformats.org/officeDocument/2006/math" xmlns="" val="1"/>
+              <ma14:wrappingTextBoxFlag xmlns="" xmlns:m="http://schemas.openxmlformats.org/officeDocument/2006/math" xmlns:a14="http://schemas.microsoft.com/office/drawing/2010/main" xmlns:ma14="http://schemas.microsoft.com/office/mac/drawingml/2011/main" val="1"/>
             </a:ext>
           </a:extLst>
         </p:spPr>
@@ -15137,7 +15342,7 @@
           </a:ln>
           <a:extLst>
             <a:ext uri="{C572A759-6A51-4108-AA02-DFA0A04FC94B}">
-              <ma14:wrappingTextBoxFlag xmlns:ma14="http://schemas.microsoft.com/office/mac/drawingml/2011/main" xmlns:a14="http://schemas.microsoft.com/office/drawing/2010/main" xmlns:m="http://schemas.openxmlformats.org/officeDocument/2006/math" xmlns="" val="1"/>
+              <ma14:wrappingTextBoxFlag xmlns="" xmlns:m="http://schemas.openxmlformats.org/officeDocument/2006/math" xmlns:a14="http://schemas.microsoft.com/office/drawing/2010/main" xmlns:ma14="http://schemas.microsoft.com/office/mac/drawingml/2011/main" val="1"/>
             </a:ext>
           </a:extLst>
         </p:spPr>
@@ -15173,7 +15378,7 @@
           </a:ln>
           <a:extLst>
             <a:ext uri="{C572A759-6A51-4108-AA02-DFA0A04FC94B}">
-              <ma14:wrappingTextBoxFlag xmlns:ma14="http://schemas.microsoft.com/office/mac/drawingml/2011/main" xmlns:a14="http://schemas.microsoft.com/office/drawing/2010/main" xmlns:m="http://schemas.openxmlformats.org/officeDocument/2006/math" xmlns="" val="1"/>
+              <ma14:wrappingTextBoxFlag xmlns="" xmlns:m="http://schemas.openxmlformats.org/officeDocument/2006/math" xmlns:a14="http://schemas.microsoft.com/office/drawing/2010/main" xmlns:ma14="http://schemas.microsoft.com/office/mac/drawingml/2011/main" val="1"/>
             </a:ext>
           </a:extLst>
         </p:spPr>
@@ -15209,7 +15414,7 @@
           </a:ln>
           <a:extLst>
             <a:ext uri="{C572A759-6A51-4108-AA02-DFA0A04FC94B}">
-              <ma14:wrappingTextBoxFlag xmlns:ma14="http://schemas.microsoft.com/office/mac/drawingml/2011/main" xmlns:a14="http://schemas.microsoft.com/office/drawing/2010/main" xmlns:m="http://schemas.openxmlformats.org/officeDocument/2006/math" xmlns="" val="1"/>
+              <ma14:wrappingTextBoxFlag xmlns="" xmlns:m="http://schemas.openxmlformats.org/officeDocument/2006/math" xmlns:a14="http://schemas.microsoft.com/office/drawing/2010/main" xmlns:ma14="http://schemas.microsoft.com/office/mac/drawingml/2011/main" val="1"/>
             </a:ext>
           </a:extLst>
         </p:spPr>
@@ -15245,7 +15450,7 @@
           </a:ln>
           <a:extLst>
             <a:ext uri="{C572A759-6A51-4108-AA02-DFA0A04FC94B}">
-              <ma14:wrappingTextBoxFlag xmlns:ma14="http://schemas.microsoft.com/office/mac/drawingml/2011/main" xmlns:a14="http://schemas.microsoft.com/office/drawing/2010/main" xmlns:m="http://schemas.openxmlformats.org/officeDocument/2006/math" xmlns="" val="1"/>
+              <ma14:wrappingTextBoxFlag xmlns="" xmlns:m="http://schemas.openxmlformats.org/officeDocument/2006/math" xmlns:a14="http://schemas.microsoft.com/office/drawing/2010/main" xmlns:ma14="http://schemas.microsoft.com/office/mac/drawingml/2011/main" val="1"/>
             </a:ext>
           </a:extLst>
         </p:spPr>
@@ -15281,7 +15486,7 @@
           </a:ln>
           <a:extLst>
             <a:ext uri="{C572A759-6A51-4108-AA02-DFA0A04FC94B}">
-              <ma14:wrappingTextBoxFlag xmlns:ma14="http://schemas.microsoft.com/office/mac/drawingml/2011/main" xmlns:a14="http://schemas.microsoft.com/office/drawing/2010/main" xmlns:m="http://schemas.openxmlformats.org/officeDocument/2006/math" xmlns="" val="1"/>
+              <ma14:wrappingTextBoxFlag xmlns="" xmlns:m="http://schemas.openxmlformats.org/officeDocument/2006/math" xmlns:a14="http://schemas.microsoft.com/office/drawing/2010/main" xmlns:ma14="http://schemas.microsoft.com/office/mac/drawingml/2011/main" val="1"/>
             </a:ext>
           </a:extLst>
         </p:spPr>
@@ -15323,7 +15528,7 @@
           </a:ln>
           <a:extLst>
             <a:ext uri="{C572A759-6A51-4108-AA02-DFA0A04FC94B}">
-              <ma14:wrappingTextBoxFlag xmlns:ma14="http://schemas.microsoft.com/office/mac/drawingml/2011/main" xmlns:a14="http://schemas.microsoft.com/office/drawing/2010/main" xmlns:m="http://schemas.openxmlformats.org/officeDocument/2006/math" xmlns="" val="1"/>
+              <ma14:wrappingTextBoxFlag xmlns="" xmlns:m="http://schemas.openxmlformats.org/officeDocument/2006/math" xmlns:a14="http://schemas.microsoft.com/office/drawing/2010/main" xmlns:ma14="http://schemas.microsoft.com/office/mac/drawingml/2011/main" val="1"/>
             </a:ext>
           </a:extLst>
         </p:spPr>
@@ -15410,7 +15615,7 @@
           </a:ln>
           <a:extLst>
             <a:ext uri="{C572A759-6A51-4108-AA02-DFA0A04FC94B}">
-              <ma14:wrappingTextBoxFlag xmlns:ma14="http://schemas.microsoft.com/office/mac/drawingml/2011/main" xmlns:a14="http://schemas.microsoft.com/office/drawing/2010/main" xmlns:m="http://schemas.openxmlformats.org/officeDocument/2006/math" xmlns="" val="1"/>
+              <ma14:wrappingTextBoxFlag xmlns="" xmlns:m="http://schemas.openxmlformats.org/officeDocument/2006/math" xmlns:a14="http://schemas.microsoft.com/office/drawing/2010/main" xmlns:ma14="http://schemas.microsoft.com/office/mac/drawingml/2011/main" val="1"/>
             </a:ext>
           </a:extLst>
         </p:spPr>
@@ -15565,7 +15770,7 @@
           </a:ln>
           <a:extLst>
             <a:ext uri="{C572A759-6A51-4108-AA02-DFA0A04FC94B}">
-              <ma14:wrappingTextBoxFlag xmlns:ma14="http://schemas.microsoft.com/office/mac/drawingml/2011/main" xmlns:a14="http://schemas.microsoft.com/office/drawing/2010/main" xmlns:m="http://schemas.openxmlformats.org/officeDocument/2006/math" xmlns="" val="1"/>
+              <ma14:wrappingTextBoxFlag xmlns="" xmlns:m="http://schemas.openxmlformats.org/officeDocument/2006/math" xmlns:a14="http://schemas.microsoft.com/office/drawing/2010/main" xmlns:ma14="http://schemas.microsoft.com/office/mac/drawingml/2011/main" val="1"/>
             </a:ext>
           </a:extLst>
         </p:spPr>
@@ -15688,7 +15893,7 @@
           </a:ln>
           <a:extLst>
             <a:ext uri="{C572A759-6A51-4108-AA02-DFA0A04FC94B}">
-              <ma14:wrappingTextBoxFlag xmlns:ma14="http://schemas.microsoft.com/office/mac/drawingml/2011/main" xmlns:a14="http://schemas.microsoft.com/office/drawing/2010/main" xmlns:m="http://schemas.openxmlformats.org/officeDocument/2006/math" xmlns="" val="1"/>
+              <ma14:wrappingTextBoxFlag xmlns="" xmlns:m="http://schemas.openxmlformats.org/officeDocument/2006/math" xmlns:a14="http://schemas.microsoft.com/office/drawing/2010/main" xmlns:ma14="http://schemas.microsoft.com/office/mac/drawingml/2011/main" val="1"/>
             </a:ext>
           </a:extLst>
         </p:spPr>
@@ -15811,7 +16016,7 @@
           </a:ln>
           <a:extLst>
             <a:ext uri="{C572A759-6A51-4108-AA02-DFA0A04FC94B}">
-              <ma14:wrappingTextBoxFlag xmlns:ma14="http://schemas.microsoft.com/office/mac/drawingml/2011/main" xmlns:a14="http://schemas.microsoft.com/office/drawing/2010/main" xmlns:m="http://schemas.openxmlformats.org/officeDocument/2006/math" xmlns="" val="1"/>
+              <ma14:wrappingTextBoxFlag xmlns="" xmlns:m="http://schemas.openxmlformats.org/officeDocument/2006/math" xmlns:a14="http://schemas.microsoft.com/office/drawing/2010/main" xmlns:ma14="http://schemas.microsoft.com/office/mac/drawingml/2011/main" val="1"/>
             </a:ext>
           </a:extLst>
         </p:spPr>
@@ -16085,7 +16290,7 @@
           </a:ln>
           <a:extLst>
             <a:ext uri="{C572A759-6A51-4108-AA02-DFA0A04FC94B}">
-              <ma14:wrappingTextBoxFlag xmlns:ma14="http://schemas.microsoft.com/office/mac/drawingml/2011/main" xmlns:a14="http://schemas.microsoft.com/office/drawing/2010/main" xmlns:m="http://schemas.openxmlformats.org/officeDocument/2006/math" xmlns="" val="1"/>
+              <ma14:wrappingTextBoxFlag xmlns="" xmlns:m="http://schemas.openxmlformats.org/officeDocument/2006/math" xmlns:a14="http://schemas.microsoft.com/office/drawing/2010/main" xmlns:ma14="http://schemas.microsoft.com/office/mac/drawingml/2011/main" val="1"/>
             </a:ext>
           </a:extLst>
         </p:spPr>
@@ -16254,7 +16459,7 @@
           </a:ln>
           <a:extLst>
             <a:ext uri="{C572A759-6A51-4108-AA02-DFA0A04FC94B}">
-              <ma14:wrappingTextBoxFlag xmlns:ma14="http://schemas.microsoft.com/office/mac/drawingml/2011/main" xmlns:a14="http://schemas.microsoft.com/office/drawing/2010/main" xmlns:m="http://schemas.openxmlformats.org/officeDocument/2006/math" xmlns="" val="1"/>
+              <ma14:wrappingTextBoxFlag xmlns="" xmlns:m="http://schemas.openxmlformats.org/officeDocument/2006/math" xmlns:a14="http://schemas.microsoft.com/office/drawing/2010/main" xmlns:ma14="http://schemas.microsoft.com/office/mac/drawingml/2011/main" val="1"/>
             </a:ext>
           </a:extLst>
         </p:spPr>
@@ -16325,7 +16530,7 @@
           </a:ln>
           <a:extLst>
             <a:ext uri="{C572A759-6A51-4108-AA02-DFA0A04FC94B}">
-              <ma14:wrappingTextBoxFlag xmlns:ma14="http://schemas.microsoft.com/office/mac/drawingml/2011/main" xmlns:a14="http://schemas.microsoft.com/office/drawing/2010/main" xmlns:m="http://schemas.openxmlformats.org/officeDocument/2006/math" xmlns="" val="1"/>
+              <ma14:wrappingTextBoxFlag xmlns="" xmlns:m="http://schemas.openxmlformats.org/officeDocument/2006/math" xmlns:a14="http://schemas.microsoft.com/office/drawing/2010/main" xmlns:ma14="http://schemas.microsoft.com/office/mac/drawingml/2011/main" val="1"/>
             </a:ext>
           </a:extLst>
         </p:spPr>
@@ -16541,7 +16746,7 @@
           </a:ln>
           <a:extLst>
             <a:ext uri="{C572A759-6A51-4108-AA02-DFA0A04FC94B}">
-              <ma14:wrappingTextBoxFlag xmlns:ma14="http://schemas.microsoft.com/office/mac/drawingml/2011/main" xmlns:a14="http://schemas.microsoft.com/office/drawing/2010/main" xmlns:m="http://schemas.openxmlformats.org/officeDocument/2006/math" xmlns="" val="1"/>
+              <ma14:wrappingTextBoxFlag xmlns="" xmlns:m="http://schemas.openxmlformats.org/officeDocument/2006/math" xmlns:a14="http://schemas.microsoft.com/office/drawing/2010/main" xmlns:ma14="http://schemas.microsoft.com/office/mac/drawingml/2011/main" val="1"/>
             </a:ext>
           </a:extLst>
         </p:spPr>
@@ -16603,7 +16808,7 @@
           </a:ln>
           <a:extLst>
             <a:ext uri="{C572A759-6A51-4108-AA02-DFA0A04FC94B}">
-              <ma14:wrappingTextBoxFlag xmlns:ma14="http://schemas.microsoft.com/office/mac/drawingml/2011/main" xmlns:a14="http://schemas.microsoft.com/office/drawing/2010/main" xmlns:m="http://schemas.openxmlformats.org/officeDocument/2006/math" xmlns="" val="1"/>
+              <ma14:wrappingTextBoxFlag xmlns="" xmlns:m="http://schemas.openxmlformats.org/officeDocument/2006/math" xmlns:a14="http://schemas.microsoft.com/office/drawing/2010/main" xmlns:ma14="http://schemas.microsoft.com/office/mac/drawingml/2011/main" val="1"/>
             </a:ext>
           </a:extLst>
         </p:spPr>
@@ -16639,7 +16844,7 @@
           </a:ln>
           <a:extLst>
             <a:ext uri="{C572A759-6A51-4108-AA02-DFA0A04FC94B}">
-              <ma14:wrappingTextBoxFlag xmlns:ma14="http://schemas.microsoft.com/office/mac/drawingml/2011/main" xmlns:a14="http://schemas.microsoft.com/office/drawing/2010/main" xmlns:m="http://schemas.openxmlformats.org/officeDocument/2006/math" xmlns="" val="1"/>
+              <ma14:wrappingTextBoxFlag xmlns="" xmlns:m="http://schemas.openxmlformats.org/officeDocument/2006/math" xmlns:a14="http://schemas.microsoft.com/office/drawing/2010/main" xmlns:ma14="http://schemas.microsoft.com/office/mac/drawingml/2011/main" val="1"/>
             </a:ext>
           </a:extLst>
         </p:spPr>
@@ -16675,7 +16880,7 @@
           </a:ln>
           <a:extLst>
             <a:ext uri="{C572A759-6A51-4108-AA02-DFA0A04FC94B}">
-              <ma14:wrappingTextBoxFlag xmlns:ma14="http://schemas.microsoft.com/office/mac/drawingml/2011/main" xmlns:a14="http://schemas.microsoft.com/office/drawing/2010/main" xmlns:m="http://schemas.openxmlformats.org/officeDocument/2006/math" xmlns="" val="1"/>
+              <ma14:wrappingTextBoxFlag xmlns="" xmlns:m="http://schemas.openxmlformats.org/officeDocument/2006/math" xmlns:a14="http://schemas.microsoft.com/office/drawing/2010/main" xmlns:ma14="http://schemas.microsoft.com/office/mac/drawingml/2011/main" val="1"/>
             </a:ext>
           </a:extLst>
         </p:spPr>
@@ -16803,9 +17008,7 @@
             <p:nvPr/>
           </p:nvPicPr>
           <p:blipFill>
-            <a:blip r:embed="rId10">
-              <a:extLst/>
-            </a:blip>
+            <a:blip r:embed="rId10"/>
             <a:stretch>
               <a:fillRect/>
             </a:stretch>
@@ -17165,9 +17368,7 @@
               <p:nvPr/>
             </p:nvPicPr>
             <p:blipFill>
-              <a:blip r:embed="rId10">
-                <a:extLst/>
-              </a:blip>
+              <a:blip r:embed="rId10"/>
               <a:stretch>
                 <a:fillRect/>
               </a:stretch>
@@ -17247,9 +17448,7 @@
               <p:nvPr/>
             </p:nvPicPr>
             <p:blipFill>
-              <a:blip r:embed="rId10">
-                <a:extLst/>
-              </a:blip>
+              <a:blip r:embed="rId10"/>
               <a:srcRect l="50670" t="5520" r="2092" b="17626"/>
               <a:stretch>
                 <a:fillRect/>
@@ -17327,9 +17526,7 @@
               <p:nvPr/>
             </p:nvPicPr>
             <p:blipFill>
-              <a:blip r:embed="rId10">
-                <a:extLst/>
-              </a:blip>
+              <a:blip r:embed="rId10"/>
               <a:srcRect l="73554" t="25553" r="2092" b="55133"/>
               <a:stretch>
                 <a:fillRect/>
@@ -17407,9 +17604,7 @@
               <p:nvPr/>
             </p:nvPicPr>
             <p:blipFill>
-              <a:blip r:embed="rId10">
-                <a:extLst/>
-              </a:blip>
+              <a:blip r:embed="rId10"/>
               <a:srcRect l="73554" t="34350" r="2092" b="60546"/>
               <a:stretch>
                 <a:fillRect/>
@@ -17468,7 +17663,7 @@
             <a:effectLst/>
             <a:extLst>
               <a:ext uri="{C572A759-6A51-4108-AA02-DFA0A04FC94B}">
-                <ma14:wrappingTextBoxFlag xmlns:ma14="http://schemas.microsoft.com/office/mac/drawingml/2011/main" xmlns:a14="http://schemas.microsoft.com/office/drawing/2010/main" xmlns:m="http://schemas.openxmlformats.org/officeDocument/2006/math" xmlns="" val="1"/>
+                <ma14:wrappingTextBoxFlag xmlns="" xmlns:m="http://schemas.openxmlformats.org/officeDocument/2006/math" xmlns:a14="http://schemas.microsoft.com/office/drawing/2010/main" xmlns:ma14="http://schemas.microsoft.com/office/mac/drawingml/2011/main" val="1"/>
               </a:ext>
             </a:extLst>
           </p:spPr>
@@ -17550,9 +17745,7 @@
               <p:nvPr/>
             </p:nvPicPr>
             <p:blipFill>
-              <a:blip r:embed="rId11">
-                <a:extLst/>
-              </a:blip>
+              <a:blip r:embed="rId11"/>
               <a:stretch>
                 <a:fillRect/>
               </a:stretch>
@@ -17739,9 +17932,7 @@
               <p:nvPr/>
             </p:nvPicPr>
             <p:blipFill>
-              <a:blip r:embed="rId11">
-                <a:extLst/>
-              </a:blip>
+              <a:blip r:embed="rId11"/>
               <a:stretch>
                 <a:fillRect/>
               </a:stretch>
@@ -17906,9 +18097,7 @@
           <p:nvPr/>
         </p:nvPicPr>
         <p:blipFill>
-          <a:blip r:embed="rId12">
-            <a:extLst/>
-          </a:blip>
+          <a:blip r:embed="rId12"/>
           <a:stretch>
             <a:fillRect/>
           </a:stretch>
@@ -17935,9 +18124,7 @@
           <p:nvPr/>
         </p:nvPicPr>
         <p:blipFill>
-          <a:blip r:embed="rId13">
-            <a:extLst/>
-          </a:blip>
+          <a:blip r:embed="rId13"/>
           <a:stretch>
             <a:fillRect/>
           </a:stretch>
@@ -17964,9 +18151,7 @@
           <p:nvPr/>
         </p:nvPicPr>
         <p:blipFill>
-          <a:blip r:embed="rId14">
-            <a:extLst/>
-          </a:blip>
+          <a:blip r:embed="rId14"/>
           <a:stretch>
             <a:fillRect/>
           </a:stretch>
@@ -17993,9 +18178,7 @@
           <p:nvPr/>
         </p:nvPicPr>
         <p:blipFill>
-          <a:blip r:embed="rId15">
-            <a:extLst/>
-          </a:blip>
+          <a:blip r:embed="rId15"/>
           <a:stretch>
             <a:fillRect/>
           </a:stretch>
@@ -18022,9 +18205,7 @@
           <p:nvPr/>
         </p:nvPicPr>
         <p:blipFill>
-          <a:blip r:embed="rId12">
-            <a:extLst/>
-          </a:blip>
+          <a:blip r:embed="rId12"/>
           <a:stretch>
             <a:fillRect/>
           </a:stretch>
@@ -18082,9 +18263,7 @@
           <p:nvPr/>
         </p:nvPicPr>
         <p:blipFill>
-          <a:blip r:embed="rId2">
-            <a:extLst/>
-          </a:blip>
+          <a:blip r:embed="rId2"/>
           <a:stretch>
             <a:fillRect/>
           </a:stretch>
@@ -18919,9 +19098,7 @@
             <p:nvPr/>
           </p:nvPicPr>
           <p:blipFill>
-            <a:blip r:embed="rId2">
-              <a:extLst/>
-            </a:blip>
+            <a:blip r:embed="rId2"/>
             <a:stretch>
               <a:fillRect/>
             </a:stretch>
@@ -19008,7 +19185,7 @@
           </a:ln>
           <a:extLst>
             <a:ext uri="{C572A759-6A51-4108-AA02-DFA0A04FC94B}">
-              <ma14:wrappingTextBoxFlag xmlns:ma14="http://schemas.microsoft.com/office/mac/drawingml/2011/main" xmlns:a14="http://schemas.microsoft.com/office/drawing/2010/main" xmlns:m="http://schemas.openxmlformats.org/officeDocument/2006/math" xmlns="" val="1"/>
+              <ma14:wrappingTextBoxFlag xmlns="" xmlns:m="http://schemas.openxmlformats.org/officeDocument/2006/math" xmlns:a14="http://schemas.microsoft.com/office/drawing/2010/main" xmlns:ma14="http://schemas.microsoft.com/office/mac/drawingml/2011/main" val="1"/>
             </a:ext>
           </a:extLst>
         </p:spPr>
@@ -19768,7 +19945,7 @@
           </a:ln>
           <a:extLst>
             <a:ext uri="{C572A759-6A51-4108-AA02-DFA0A04FC94B}">
-              <ma14:wrappingTextBoxFlag xmlns:ma14="http://schemas.microsoft.com/office/mac/drawingml/2011/main" xmlns:a14="http://schemas.microsoft.com/office/drawing/2010/main" xmlns:m="http://schemas.openxmlformats.org/officeDocument/2006/math" xmlns="" val="1"/>
+              <ma14:wrappingTextBoxFlag xmlns="" xmlns:m="http://schemas.openxmlformats.org/officeDocument/2006/math" xmlns:a14="http://schemas.microsoft.com/office/drawing/2010/main" xmlns:ma14="http://schemas.microsoft.com/office/mac/drawingml/2011/main" val="1"/>
             </a:ext>
           </a:extLst>
         </p:spPr>
@@ -19816,7 +19993,7 @@
           </a:ln>
           <a:extLst>
             <a:ext uri="{C572A759-6A51-4108-AA02-DFA0A04FC94B}">
-              <ma14:wrappingTextBoxFlag xmlns:ma14="http://schemas.microsoft.com/office/mac/drawingml/2011/main" xmlns:a14="http://schemas.microsoft.com/office/drawing/2010/main" xmlns:m="http://schemas.openxmlformats.org/officeDocument/2006/math" xmlns="" val="1"/>
+              <ma14:wrappingTextBoxFlag xmlns="" xmlns:m="http://schemas.openxmlformats.org/officeDocument/2006/math" xmlns:a14="http://schemas.microsoft.com/office/drawing/2010/main" xmlns:ma14="http://schemas.microsoft.com/office/mac/drawingml/2011/main" val="1"/>
             </a:ext>
           </a:extLst>
         </p:spPr>
@@ -19886,7 +20063,7 @@
           </a:ln>
           <a:extLst>
             <a:ext uri="{C572A759-6A51-4108-AA02-DFA0A04FC94B}">
-              <ma14:wrappingTextBoxFlag xmlns:ma14="http://schemas.microsoft.com/office/mac/drawingml/2011/main" xmlns:a14="http://schemas.microsoft.com/office/drawing/2010/main" xmlns:m="http://schemas.openxmlformats.org/officeDocument/2006/math" xmlns="" val="1"/>
+              <ma14:wrappingTextBoxFlag xmlns="" xmlns:m="http://schemas.openxmlformats.org/officeDocument/2006/math" xmlns:a14="http://schemas.microsoft.com/office/drawing/2010/main" xmlns:ma14="http://schemas.microsoft.com/office/mac/drawingml/2011/main" val="1"/>
             </a:ext>
           </a:extLst>
         </p:spPr>
@@ -19941,7 +20118,7 @@
           </a:ln>
           <a:extLst>
             <a:ext uri="{C572A759-6A51-4108-AA02-DFA0A04FC94B}">
-              <ma14:wrappingTextBoxFlag xmlns:ma14="http://schemas.microsoft.com/office/mac/drawingml/2011/main" xmlns:a14="http://schemas.microsoft.com/office/drawing/2010/main" xmlns:m="http://schemas.openxmlformats.org/officeDocument/2006/math" xmlns="" val="1"/>
+              <ma14:wrappingTextBoxFlag xmlns="" xmlns:m="http://schemas.openxmlformats.org/officeDocument/2006/math" xmlns:a14="http://schemas.microsoft.com/office/drawing/2010/main" xmlns:ma14="http://schemas.microsoft.com/office/mac/drawingml/2011/main" val="1"/>
             </a:ext>
           </a:extLst>
         </p:spPr>
@@ -20023,7 +20200,7 @@
           </a:ln>
           <a:extLst>
             <a:ext uri="{C572A759-6A51-4108-AA02-DFA0A04FC94B}">
-              <ma14:wrappingTextBoxFlag xmlns:ma14="http://schemas.microsoft.com/office/mac/drawingml/2011/main" xmlns:a14="http://schemas.microsoft.com/office/drawing/2010/main" xmlns:m="http://schemas.openxmlformats.org/officeDocument/2006/math" xmlns="" val="1"/>
+              <ma14:wrappingTextBoxFlag xmlns="" xmlns:m="http://schemas.openxmlformats.org/officeDocument/2006/math" xmlns:a14="http://schemas.microsoft.com/office/drawing/2010/main" xmlns:ma14="http://schemas.microsoft.com/office/mac/drawingml/2011/main" val="1"/>
             </a:ext>
           </a:extLst>
         </p:spPr>
@@ -20082,7 +20259,7 @@
           </a:ln>
           <a:extLst>
             <a:ext uri="{C572A759-6A51-4108-AA02-DFA0A04FC94B}">
-              <ma14:wrappingTextBoxFlag xmlns:ma14="http://schemas.microsoft.com/office/mac/drawingml/2011/main" xmlns:a14="http://schemas.microsoft.com/office/drawing/2010/main" xmlns:m="http://schemas.openxmlformats.org/officeDocument/2006/math" xmlns="" val="1"/>
+              <ma14:wrappingTextBoxFlag xmlns="" xmlns:m="http://schemas.openxmlformats.org/officeDocument/2006/math" xmlns:a14="http://schemas.microsoft.com/office/drawing/2010/main" xmlns:ma14="http://schemas.microsoft.com/office/mac/drawingml/2011/main" val="1"/>
             </a:ext>
           </a:extLst>
         </p:spPr>
@@ -20190,7 +20367,7 @@
           </a:ln>
           <a:extLst>
             <a:ext uri="{C572A759-6A51-4108-AA02-DFA0A04FC94B}">
-              <ma14:wrappingTextBoxFlag xmlns:ma14="http://schemas.microsoft.com/office/mac/drawingml/2011/main" xmlns:a14="http://schemas.microsoft.com/office/drawing/2010/main" xmlns:m="http://schemas.openxmlformats.org/officeDocument/2006/math" xmlns="" val="1"/>
+              <ma14:wrappingTextBoxFlag xmlns="" xmlns:m="http://schemas.openxmlformats.org/officeDocument/2006/math" xmlns:a14="http://schemas.microsoft.com/office/drawing/2010/main" xmlns:ma14="http://schemas.microsoft.com/office/mac/drawingml/2011/main" val="1"/>
             </a:ext>
           </a:extLst>
         </p:spPr>
@@ -20255,7 +20432,7 @@
             <a:effectLst/>
             <a:extLst>
               <a:ext uri="{C572A759-6A51-4108-AA02-DFA0A04FC94B}">
-                <ma14:wrappingTextBoxFlag xmlns:ma14="http://schemas.microsoft.com/office/mac/drawingml/2011/main" xmlns:a14="http://schemas.microsoft.com/office/drawing/2010/main" xmlns:m="http://schemas.openxmlformats.org/officeDocument/2006/math" xmlns="" val="1"/>
+                <ma14:wrappingTextBoxFlag xmlns="" xmlns:m="http://schemas.openxmlformats.org/officeDocument/2006/math" xmlns:a14="http://schemas.microsoft.com/office/drawing/2010/main" xmlns:ma14="http://schemas.microsoft.com/office/mac/drawingml/2011/main" val="1"/>
               </a:ext>
             </a:extLst>
           </p:spPr>
@@ -20387,9 +20564,7 @@
             <p:nvPr/>
           </p:nvPicPr>
           <p:blipFill>
-            <a:blip r:embed="rId6">
-              <a:extLst/>
-            </a:blip>
+            <a:blip r:embed="rId6"/>
             <a:stretch>
               <a:fillRect/>
             </a:stretch>
@@ -20431,7 +20606,7 @@
             <a:effectLst/>
             <a:extLst>
               <a:ext uri="{C572A759-6A51-4108-AA02-DFA0A04FC94B}">
-                <ma14:wrappingTextBoxFlag xmlns:ma14="http://schemas.microsoft.com/office/mac/drawingml/2011/main" xmlns:a14="http://schemas.microsoft.com/office/drawing/2010/main" xmlns:m="http://schemas.openxmlformats.org/officeDocument/2006/math" xmlns="" val="1"/>
+                <ma14:wrappingTextBoxFlag xmlns="" xmlns:m="http://schemas.openxmlformats.org/officeDocument/2006/math" xmlns:a14="http://schemas.microsoft.com/office/drawing/2010/main" xmlns:ma14="http://schemas.microsoft.com/office/mac/drawingml/2011/main" val="1"/>
               </a:ext>
             </a:extLst>
           </p:spPr>
@@ -20522,7 +20697,7 @@
           </a:ln>
           <a:extLst>
             <a:ext uri="{C572A759-6A51-4108-AA02-DFA0A04FC94B}">
-              <ma14:wrappingTextBoxFlag xmlns:ma14="http://schemas.microsoft.com/office/mac/drawingml/2011/main" xmlns:a14="http://schemas.microsoft.com/office/drawing/2010/main" xmlns:m="http://schemas.openxmlformats.org/officeDocument/2006/math" xmlns="" val="1"/>
+              <ma14:wrappingTextBoxFlag xmlns="" xmlns:m="http://schemas.openxmlformats.org/officeDocument/2006/math" xmlns:a14="http://schemas.microsoft.com/office/drawing/2010/main" xmlns:ma14="http://schemas.microsoft.com/office/mac/drawingml/2011/main" val="1"/>
             </a:ext>
           </a:extLst>
         </p:spPr>
@@ -20582,7 +20757,7 @@
           </a:ln>
           <a:extLst>
             <a:ext uri="{C572A759-6A51-4108-AA02-DFA0A04FC94B}">
-              <ma14:wrappingTextBoxFlag xmlns:ma14="http://schemas.microsoft.com/office/mac/drawingml/2011/main" xmlns:a14="http://schemas.microsoft.com/office/drawing/2010/main" xmlns:m="http://schemas.openxmlformats.org/officeDocument/2006/math" xmlns="" val="1"/>
+              <ma14:wrappingTextBoxFlag xmlns="" xmlns:m="http://schemas.openxmlformats.org/officeDocument/2006/math" xmlns:a14="http://schemas.microsoft.com/office/drawing/2010/main" xmlns:ma14="http://schemas.microsoft.com/office/mac/drawingml/2011/main" val="1"/>
             </a:ext>
           </a:extLst>
         </p:spPr>
@@ -20642,7 +20817,7 @@
           </a:ln>
           <a:extLst>
             <a:ext uri="{C572A759-6A51-4108-AA02-DFA0A04FC94B}">
-              <ma14:wrappingTextBoxFlag xmlns:ma14="http://schemas.microsoft.com/office/mac/drawingml/2011/main" xmlns:a14="http://schemas.microsoft.com/office/drawing/2010/main" xmlns:m="http://schemas.openxmlformats.org/officeDocument/2006/math" xmlns="" val="1"/>
+              <ma14:wrappingTextBoxFlag xmlns="" xmlns:m="http://schemas.openxmlformats.org/officeDocument/2006/math" xmlns:a14="http://schemas.microsoft.com/office/drawing/2010/main" xmlns:ma14="http://schemas.microsoft.com/office/mac/drawingml/2011/main" val="1"/>
             </a:ext>
           </a:extLst>
         </p:spPr>
@@ -20702,7 +20877,7 @@
           </a:ln>
           <a:extLst>
             <a:ext uri="{C572A759-6A51-4108-AA02-DFA0A04FC94B}">
-              <ma14:wrappingTextBoxFlag xmlns:ma14="http://schemas.microsoft.com/office/mac/drawingml/2011/main" xmlns:a14="http://schemas.microsoft.com/office/drawing/2010/main" xmlns:m="http://schemas.openxmlformats.org/officeDocument/2006/math" xmlns="" val="1"/>
+              <ma14:wrappingTextBoxFlag xmlns="" xmlns:m="http://schemas.openxmlformats.org/officeDocument/2006/math" xmlns:a14="http://schemas.microsoft.com/office/drawing/2010/main" xmlns:ma14="http://schemas.microsoft.com/office/mac/drawingml/2011/main" val="1"/>
             </a:ext>
           </a:extLst>
         </p:spPr>
@@ -20762,7 +20937,7 @@
           </a:ln>
           <a:extLst>
             <a:ext uri="{C572A759-6A51-4108-AA02-DFA0A04FC94B}">
-              <ma14:wrappingTextBoxFlag xmlns:ma14="http://schemas.microsoft.com/office/mac/drawingml/2011/main" xmlns:a14="http://schemas.microsoft.com/office/drawing/2010/main" xmlns:m="http://schemas.openxmlformats.org/officeDocument/2006/math" xmlns="" val="1"/>
+              <ma14:wrappingTextBoxFlag xmlns="" xmlns:m="http://schemas.openxmlformats.org/officeDocument/2006/math" xmlns:a14="http://schemas.microsoft.com/office/drawing/2010/main" xmlns:ma14="http://schemas.microsoft.com/office/mac/drawingml/2011/main" val="1"/>
             </a:ext>
           </a:extLst>
         </p:spPr>
@@ -20884,7 +21059,7 @@
           </a:ln>
           <a:extLst>
             <a:ext uri="{C572A759-6A51-4108-AA02-DFA0A04FC94B}">
-              <ma14:wrappingTextBoxFlag xmlns:ma14="http://schemas.microsoft.com/office/mac/drawingml/2011/main" xmlns:a14="http://schemas.microsoft.com/office/drawing/2010/main" xmlns:m="http://schemas.openxmlformats.org/officeDocument/2006/math" xmlns="" val="1"/>
+              <ma14:wrappingTextBoxFlag xmlns="" xmlns:m="http://schemas.openxmlformats.org/officeDocument/2006/math" xmlns:a14="http://schemas.microsoft.com/office/drawing/2010/main" xmlns:ma14="http://schemas.microsoft.com/office/mac/drawingml/2011/main" val="1"/>
             </a:ext>
           </a:extLst>
         </p:spPr>
@@ -20961,7 +21136,7 @@
           </a:ln>
           <a:extLst>
             <a:ext uri="{C572A759-6A51-4108-AA02-DFA0A04FC94B}">
-              <ma14:wrappingTextBoxFlag xmlns:ma14="http://schemas.microsoft.com/office/mac/drawingml/2011/main" xmlns:a14="http://schemas.microsoft.com/office/drawing/2010/main" xmlns:m="http://schemas.openxmlformats.org/officeDocument/2006/math" xmlns="" val="1"/>
+              <ma14:wrappingTextBoxFlag xmlns="" xmlns:m="http://schemas.openxmlformats.org/officeDocument/2006/math" xmlns:a14="http://schemas.microsoft.com/office/drawing/2010/main" xmlns:ma14="http://schemas.microsoft.com/office/mac/drawingml/2011/main" val="1"/>
             </a:ext>
           </a:extLst>
         </p:spPr>
@@ -21038,7 +21213,7 @@
           </a:ln>
           <a:extLst>
             <a:ext uri="{C572A759-6A51-4108-AA02-DFA0A04FC94B}">
-              <ma14:wrappingTextBoxFlag xmlns:ma14="http://schemas.microsoft.com/office/mac/drawingml/2011/main" xmlns:a14="http://schemas.microsoft.com/office/drawing/2010/main" xmlns:m="http://schemas.openxmlformats.org/officeDocument/2006/math" xmlns="" val="1"/>
+              <ma14:wrappingTextBoxFlag xmlns="" xmlns:m="http://schemas.openxmlformats.org/officeDocument/2006/math" xmlns:a14="http://schemas.microsoft.com/office/drawing/2010/main" xmlns:ma14="http://schemas.microsoft.com/office/mac/drawingml/2011/main" val="1"/>
             </a:ext>
           </a:extLst>
         </p:spPr>
@@ -21281,7 +21456,7 @@
             <a:effectLst/>
             <a:extLst>
               <a:ext uri="{C572A759-6A51-4108-AA02-DFA0A04FC94B}">
-                <ma14:wrappingTextBoxFlag xmlns:ma14="http://schemas.microsoft.com/office/mac/drawingml/2011/main" xmlns:a14="http://schemas.microsoft.com/office/drawing/2010/main" xmlns:m="http://schemas.openxmlformats.org/officeDocument/2006/math" xmlns="" val="1"/>
+                <ma14:wrappingTextBoxFlag xmlns="" xmlns:m="http://schemas.openxmlformats.org/officeDocument/2006/math" xmlns:a14="http://schemas.microsoft.com/office/drawing/2010/main" xmlns:ma14="http://schemas.microsoft.com/office/mac/drawingml/2011/main" val="1"/>
               </a:ext>
             </a:extLst>
           </p:spPr>
@@ -21452,7 +21627,7 @@
             <a:effectLst/>
             <a:extLst>
               <a:ext uri="{C572A759-6A51-4108-AA02-DFA0A04FC94B}">
-                <ma14:wrappingTextBoxFlag xmlns:ma14="http://schemas.microsoft.com/office/mac/drawingml/2011/main" xmlns:a14="http://schemas.microsoft.com/office/drawing/2010/main" xmlns:m="http://schemas.openxmlformats.org/officeDocument/2006/math" xmlns="" val="1"/>
+                <ma14:wrappingTextBoxFlag xmlns="" xmlns:m="http://schemas.openxmlformats.org/officeDocument/2006/math" xmlns:a14="http://schemas.microsoft.com/office/drawing/2010/main" xmlns:ma14="http://schemas.microsoft.com/office/mac/drawingml/2011/main" val="1"/>
               </a:ext>
             </a:extLst>
           </p:spPr>
@@ -21566,7 +21741,7 @@
             <a:effectLst/>
             <a:extLst>
               <a:ext uri="{C572A759-6A51-4108-AA02-DFA0A04FC94B}">
-                <ma14:wrappingTextBoxFlag xmlns:ma14="http://schemas.microsoft.com/office/mac/drawingml/2011/main" xmlns:a14="http://schemas.microsoft.com/office/drawing/2010/main" xmlns:m="http://schemas.openxmlformats.org/officeDocument/2006/math" xmlns="" val="1"/>
+                <ma14:wrappingTextBoxFlag xmlns="" xmlns:m="http://schemas.openxmlformats.org/officeDocument/2006/math" xmlns:a14="http://schemas.microsoft.com/office/drawing/2010/main" xmlns:ma14="http://schemas.microsoft.com/office/mac/drawingml/2011/main" val="1"/>
               </a:ext>
             </a:extLst>
           </p:spPr>
@@ -21632,7 +21807,7 @@
             <a:effectLst/>
             <a:extLst>
               <a:ext uri="{C572A759-6A51-4108-AA02-DFA0A04FC94B}">
-                <ma14:wrappingTextBoxFlag xmlns:ma14="http://schemas.microsoft.com/office/mac/drawingml/2011/main" xmlns:a14="http://schemas.microsoft.com/office/drawing/2010/main" xmlns:m="http://schemas.openxmlformats.org/officeDocument/2006/math" xmlns="" val="1"/>
+                <ma14:wrappingTextBoxFlag xmlns="" xmlns:m="http://schemas.openxmlformats.org/officeDocument/2006/math" xmlns:a14="http://schemas.microsoft.com/office/drawing/2010/main" xmlns:ma14="http://schemas.microsoft.com/office/mac/drawingml/2011/main" val="1"/>
               </a:ext>
             </a:extLst>
           </p:spPr>
@@ -21728,7 +21903,7 @@
           </a:ln>
           <a:extLst>
             <a:ext uri="{C572A759-6A51-4108-AA02-DFA0A04FC94B}">
-              <ma14:wrappingTextBoxFlag xmlns:ma14="http://schemas.microsoft.com/office/mac/drawingml/2011/main" xmlns:a14="http://schemas.microsoft.com/office/drawing/2010/main" xmlns:m="http://schemas.openxmlformats.org/officeDocument/2006/math" xmlns="" val="1"/>
+              <ma14:wrappingTextBoxFlag xmlns="" xmlns:m="http://schemas.openxmlformats.org/officeDocument/2006/math" xmlns:a14="http://schemas.microsoft.com/office/drawing/2010/main" xmlns:ma14="http://schemas.microsoft.com/office/mac/drawingml/2011/main" val="1"/>
             </a:ext>
           </a:extLst>
         </p:spPr>
@@ -21928,7 +22103,7 @@
           </a:ln>
           <a:extLst>
             <a:ext uri="{C572A759-6A51-4108-AA02-DFA0A04FC94B}">
-              <ma14:wrappingTextBoxFlag xmlns:ma14="http://schemas.microsoft.com/office/mac/drawingml/2011/main" xmlns:a14="http://schemas.microsoft.com/office/drawing/2010/main" xmlns:m="http://schemas.openxmlformats.org/officeDocument/2006/math" xmlns="" val="1"/>
+              <ma14:wrappingTextBoxFlag xmlns="" xmlns:m="http://schemas.openxmlformats.org/officeDocument/2006/math" xmlns:a14="http://schemas.microsoft.com/office/drawing/2010/main" xmlns:ma14="http://schemas.microsoft.com/office/mac/drawingml/2011/main" val="1"/>
             </a:ext>
           </a:extLst>
         </p:spPr>
@@ -22097,7 +22272,7 @@
           </a:ln>
           <a:extLst>
             <a:ext uri="{C572A759-6A51-4108-AA02-DFA0A04FC94B}">
-              <ma14:wrappingTextBoxFlag xmlns:ma14="http://schemas.microsoft.com/office/mac/drawingml/2011/main" xmlns:a14="http://schemas.microsoft.com/office/drawing/2010/main" xmlns:m="http://schemas.openxmlformats.org/officeDocument/2006/math" xmlns="" val="1"/>
+              <ma14:wrappingTextBoxFlag xmlns="" xmlns:m="http://schemas.openxmlformats.org/officeDocument/2006/math" xmlns:a14="http://schemas.microsoft.com/office/drawing/2010/main" xmlns:ma14="http://schemas.microsoft.com/office/mac/drawingml/2011/main" val="1"/>
             </a:ext>
           </a:extLst>
         </p:spPr>
@@ -22168,7 +22343,7 @@
           </a:ln>
           <a:extLst>
             <a:ext uri="{C572A759-6A51-4108-AA02-DFA0A04FC94B}">
-              <ma14:wrappingTextBoxFlag xmlns:ma14="http://schemas.microsoft.com/office/mac/drawingml/2011/main" xmlns:a14="http://schemas.microsoft.com/office/drawing/2010/main" xmlns:m="http://schemas.openxmlformats.org/officeDocument/2006/math" xmlns="" val="1"/>
+              <ma14:wrappingTextBoxFlag xmlns="" xmlns:m="http://schemas.openxmlformats.org/officeDocument/2006/math" xmlns:a14="http://schemas.microsoft.com/office/drawing/2010/main" xmlns:ma14="http://schemas.microsoft.com/office/mac/drawingml/2011/main" val="1"/>
             </a:ext>
           </a:extLst>
         </p:spPr>
@@ -22384,7 +22559,7 @@
           </a:ln>
           <a:extLst>
             <a:ext uri="{C572A759-6A51-4108-AA02-DFA0A04FC94B}">
-              <ma14:wrappingTextBoxFlag xmlns:ma14="http://schemas.microsoft.com/office/mac/drawingml/2011/main" xmlns:a14="http://schemas.microsoft.com/office/drawing/2010/main" xmlns:m="http://schemas.openxmlformats.org/officeDocument/2006/math" xmlns="" val="1"/>
+              <ma14:wrappingTextBoxFlag xmlns="" xmlns:m="http://schemas.openxmlformats.org/officeDocument/2006/math" xmlns:a14="http://schemas.microsoft.com/office/drawing/2010/main" xmlns:ma14="http://schemas.microsoft.com/office/mac/drawingml/2011/main" val="1"/>
             </a:ext>
           </a:extLst>
         </p:spPr>
@@ -22446,7 +22621,7 @@
           </a:ln>
           <a:extLst>
             <a:ext uri="{C572A759-6A51-4108-AA02-DFA0A04FC94B}">
-              <ma14:wrappingTextBoxFlag xmlns:ma14="http://schemas.microsoft.com/office/mac/drawingml/2011/main" xmlns:a14="http://schemas.microsoft.com/office/drawing/2010/main" xmlns:m="http://schemas.openxmlformats.org/officeDocument/2006/math" xmlns="" val="1"/>
+              <ma14:wrappingTextBoxFlag xmlns="" xmlns:m="http://schemas.openxmlformats.org/officeDocument/2006/math" xmlns:a14="http://schemas.microsoft.com/office/drawing/2010/main" xmlns:ma14="http://schemas.microsoft.com/office/mac/drawingml/2011/main" val="1"/>
             </a:ext>
           </a:extLst>
         </p:spPr>
@@ -22482,7 +22657,7 @@
           </a:ln>
           <a:extLst>
             <a:ext uri="{C572A759-6A51-4108-AA02-DFA0A04FC94B}">
-              <ma14:wrappingTextBoxFlag xmlns:ma14="http://schemas.microsoft.com/office/mac/drawingml/2011/main" xmlns:a14="http://schemas.microsoft.com/office/drawing/2010/main" xmlns:m="http://schemas.openxmlformats.org/officeDocument/2006/math" xmlns="" val="1"/>
+              <ma14:wrappingTextBoxFlag xmlns="" xmlns:m="http://schemas.openxmlformats.org/officeDocument/2006/math" xmlns:a14="http://schemas.microsoft.com/office/drawing/2010/main" xmlns:ma14="http://schemas.microsoft.com/office/mac/drawingml/2011/main" val="1"/>
             </a:ext>
           </a:extLst>
         </p:spPr>
@@ -22518,7 +22693,7 @@
           </a:ln>
           <a:extLst>
             <a:ext uri="{C572A759-6A51-4108-AA02-DFA0A04FC94B}">
-              <ma14:wrappingTextBoxFlag xmlns:ma14="http://schemas.microsoft.com/office/mac/drawingml/2011/main" xmlns:a14="http://schemas.microsoft.com/office/drawing/2010/main" xmlns:m="http://schemas.openxmlformats.org/officeDocument/2006/math" xmlns="" val="1"/>
+              <ma14:wrappingTextBoxFlag xmlns="" xmlns:m="http://schemas.openxmlformats.org/officeDocument/2006/math" xmlns:a14="http://schemas.microsoft.com/office/drawing/2010/main" xmlns:ma14="http://schemas.microsoft.com/office/mac/drawingml/2011/main" val="1"/>
             </a:ext>
           </a:extLst>
         </p:spPr>
@@ -22554,7 +22729,7 @@
           </a:ln>
           <a:extLst>
             <a:ext uri="{C572A759-6A51-4108-AA02-DFA0A04FC94B}">
-              <ma14:wrappingTextBoxFlag xmlns:ma14="http://schemas.microsoft.com/office/mac/drawingml/2011/main" xmlns:a14="http://schemas.microsoft.com/office/drawing/2010/main" xmlns:m="http://schemas.openxmlformats.org/officeDocument/2006/math" xmlns="" val="1"/>
+              <ma14:wrappingTextBoxFlag xmlns="" xmlns:m="http://schemas.openxmlformats.org/officeDocument/2006/math" xmlns:a14="http://schemas.microsoft.com/office/drawing/2010/main" xmlns:ma14="http://schemas.microsoft.com/office/mac/drawingml/2011/main" val="1"/>
             </a:ext>
           </a:extLst>
         </p:spPr>
@@ -22619,7 +22794,7 @@
           </a:ln>
           <a:extLst>
             <a:ext uri="{C572A759-6A51-4108-AA02-DFA0A04FC94B}">
-              <ma14:wrappingTextBoxFlag xmlns:ma14="http://schemas.microsoft.com/office/mac/drawingml/2011/main" xmlns:a14="http://schemas.microsoft.com/office/drawing/2010/main" xmlns:m="http://schemas.openxmlformats.org/officeDocument/2006/math" xmlns="" val="1"/>
+              <ma14:wrappingTextBoxFlag xmlns="" xmlns:m="http://schemas.openxmlformats.org/officeDocument/2006/math" xmlns:a14="http://schemas.microsoft.com/office/drawing/2010/main" xmlns:ma14="http://schemas.microsoft.com/office/mac/drawingml/2011/main" val="1"/>
             </a:ext>
           </a:extLst>
         </p:spPr>
@@ -23282,7 +23457,7 @@
           </a:ln>
           <a:extLst>
             <a:ext uri="{C572A759-6A51-4108-AA02-DFA0A04FC94B}">
-              <ma14:wrappingTextBoxFlag xmlns:ma14="http://schemas.microsoft.com/office/mac/drawingml/2011/main" xmlns:a14="http://schemas.microsoft.com/office/drawing/2010/main" xmlns:m="http://schemas.openxmlformats.org/officeDocument/2006/math" xmlns="" val="1"/>
+              <ma14:wrappingTextBoxFlag xmlns="" xmlns:m="http://schemas.openxmlformats.org/officeDocument/2006/math" xmlns:a14="http://schemas.microsoft.com/office/drawing/2010/main" xmlns:ma14="http://schemas.microsoft.com/office/mac/drawingml/2011/main" val="1"/>
             </a:ext>
           </a:extLst>
         </p:spPr>
@@ -23318,7 +23493,7 @@
           </a:ln>
           <a:extLst>
             <a:ext uri="{C572A759-6A51-4108-AA02-DFA0A04FC94B}">
-              <ma14:wrappingTextBoxFlag xmlns:ma14="http://schemas.microsoft.com/office/mac/drawingml/2011/main" xmlns:a14="http://schemas.microsoft.com/office/drawing/2010/main" xmlns:m="http://schemas.openxmlformats.org/officeDocument/2006/math" xmlns="" val="1"/>
+              <ma14:wrappingTextBoxFlag xmlns="" xmlns:m="http://schemas.openxmlformats.org/officeDocument/2006/math" xmlns:a14="http://schemas.microsoft.com/office/drawing/2010/main" xmlns:ma14="http://schemas.microsoft.com/office/mac/drawingml/2011/main" val="1"/>
             </a:ext>
           </a:extLst>
         </p:spPr>
@@ -23354,7 +23529,7 @@
           </a:ln>
           <a:extLst>
             <a:ext uri="{C572A759-6A51-4108-AA02-DFA0A04FC94B}">
-              <ma14:wrappingTextBoxFlag xmlns:ma14="http://schemas.microsoft.com/office/mac/drawingml/2011/main" xmlns:a14="http://schemas.microsoft.com/office/drawing/2010/main" xmlns:m="http://schemas.openxmlformats.org/officeDocument/2006/math" xmlns="" val="1"/>
+              <ma14:wrappingTextBoxFlag xmlns="" xmlns:m="http://schemas.openxmlformats.org/officeDocument/2006/math" xmlns:a14="http://schemas.microsoft.com/office/drawing/2010/main" xmlns:ma14="http://schemas.microsoft.com/office/mac/drawingml/2011/main" val="1"/>
             </a:ext>
           </a:extLst>
         </p:spPr>
@@ -23390,7 +23565,7 @@
           </a:ln>
           <a:extLst>
             <a:ext uri="{C572A759-6A51-4108-AA02-DFA0A04FC94B}">
-              <ma14:wrappingTextBoxFlag xmlns:ma14="http://schemas.microsoft.com/office/mac/drawingml/2011/main" xmlns:a14="http://schemas.microsoft.com/office/drawing/2010/main" xmlns:m="http://schemas.openxmlformats.org/officeDocument/2006/math" xmlns="" val="1"/>
+              <ma14:wrappingTextBoxFlag xmlns="" xmlns:m="http://schemas.openxmlformats.org/officeDocument/2006/math" xmlns:a14="http://schemas.microsoft.com/office/drawing/2010/main" xmlns:ma14="http://schemas.microsoft.com/office/mac/drawingml/2011/main" val="1"/>
             </a:ext>
           </a:extLst>
         </p:spPr>
@@ -23426,7 +23601,7 @@
           </a:ln>
           <a:extLst>
             <a:ext uri="{C572A759-6A51-4108-AA02-DFA0A04FC94B}">
-              <ma14:wrappingTextBoxFlag xmlns:ma14="http://schemas.microsoft.com/office/mac/drawingml/2011/main" xmlns:a14="http://schemas.microsoft.com/office/drawing/2010/main" xmlns:m="http://schemas.openxmlformats.org/officeDocument/2006/math" xmlns="" val="1"/>
+              <ma14:wrappingTextBoxFlag xmlns="" xmlns:m="http://schemas.openxmlformats.org/officeDocument/2006/math" xmlns:a14="http://schemas.microsoft.com/office/drawing/2010/main" xmlns:ma14="http://schemas.microsoft.com/office/mac/drawingml/2011/main" val="1"/>
             </a:ext>
           </a:extLst>
         </p:spPr>
@@ -23468,7 +23643,7 @@
           </a:ln>
           <a:extLst>
             <a:ext uri="{C572A759-6A51-4108-AA02-DFA0A04FC94B}">
-              <ma14:wrappingTextBoxFlag xmlns:ma14="http://schemas.microsoft.com/office/mac/drawingml/2011/main" xmlns:a14="http://schemas.microsoft.com/office/drawing/2010/main" xmlns:m="http://schemas.openxmlformats.org/officeDocument/2006/math" xmlns="" val="1"/>
+              <ma14:wrappingTextBoxFlag xmlns="" xmlns:m="http://schemas.openxmlformats.org/officeDocument/2006/math" xmlns:a14="http://schemas.microsoft.com/office/drawing/2010/main" xmlns:ma14="http://schemas.microsoft.com/office/mac/drawingml/2011/main" val="1"/>
             </a:ext>
           </a:extLst>
         </p:spPr>
@@ -23555,7 +23730,7 @@
           </a:ln>
           <a:extLst>
             <a:ext uri="{C572A759-6A51-4108-AA02-DFA0A04FC94B}">
-              <ma14:wrappingTextBoxFlag xmlns:ma14="http://schemas.microsoft.com/office/mac/drawingml/2011/main" xmlns:a14="http://schemas.microsoft.com/office/drawing/2010/main" xmlns:m="http://schemas.openxmlformats.org/officeDocument/2006/math" xmlns="" val="1"/>
+              <ma14:wrappingTextBoxFlag xmlns="" xmlns:m="http://schemas.openxmlformats.org/officeDocument/2006/math" xmlns:a14="http://schemas.microsoft.com/office/drawing/2010/main" xmlns:ma14="http://schemas.microsoft.com/office/mac/drawingml/2011/main" val="1"/>
             </a:ext>
           </a:extLst>
         </p:spPr>
@@ -23641,7 +23816,7 @@
           </a:ln>
           <a:extLst>
             <a:ext uri="{C572A759-6A51-4108-AA02-DFA0A04FC94B}">
-              <ma14:wrappingTextBoxFlag xmlns:ma14="http://schemas.microsoft.com/office/mac/drawingml/2011/main" xmlns:a14="http://schemas.microsoft.com/office/drawing/2010/main" xmlns:m="http://schemas.openxmlformats.org/officeDocument/2006/math" xmlns="" val="1"/>
+              <ma14:wrappingTextBoxFlag xmlns="" xmlns:m="http://schemas.openxmlformats.org/officeDocument/2006/math" xmlns:a14="http://schemas.microsoft.com/office/drawing/2010/main" xmlns:ma14="http://schemas.microsoft.com/office/mac/drawingml/2011/main" val="1"/>
             </a:ext>
           </a:extLst>
         </p:spPr>
@@ -23689,7 +23864,7 @@
           </a:ln>
           <a:extLst>
             <a:ext uri="{C572A759-6A51-4108-AA02-DFA0A04FC94B}">
-              <ma14:wrappingTextBoxFlag xmlns:ma14="http://schemas.microsoft.com/office/mac/drawingml/2011/main" xmlns:a14="http://schemas.microsoft.com/office/drawing/2010/main" xmlns:m="http://schemas.openxmlformats.org/officeDocument/2006/math" xmlns="" val="1"/>
+              <ma14:wrappingTextBoxFlag xmlns="" xmlns:m="http://schemas.openxmlformats.org/officeDocument/2006/math" xmlns:a14="http://schemas.microsoft.com/office/drawing/2010/main" xmlns:ma14="http://schemas.microsoft.com/office/mac/drawingml/2011/main" val="1"/>
             </a:ext>
           </a:extLst>
         </p:spPr>
@@ -23737,7 +23912,7 @@
           </a:ln>
           <a:extLst>
             <a:ext uri="{C572A759-6A51-4108-AA02-DFA0A04FC94B}">
-              <ma14:wrappingTextBoxFlag xmlns:ma14="http://schemas.microsoft.com/office/mac/drawingml/2011/main" xmlns:a14="http://schemas.microsoft.com/office/drawing/2010/main" xmlns:m="http://schemas.openxmlformats.org/officeDocument/2006/math" xmlns="" val="1"/>
+              <ma14:wrappingTextBoxFlag xmlns="" xmlns:m="http://schemas.openxmlformats.org/officeDocument/2006/math" xmlns:a14="http://schemas.microsoft.com/office/drawing/2010/main" xmlns:ma14="http://schemas.microsoft.com/office/mac/drawingml/2011/main" val="1"/>
             </a:ext>
           </a:extLst>
         </p:spPr>
@@ -23829,7 +24004,7 @@
           </a:ln>
           <a:extLst>
             <a:ext uri="{C572A759-6A51-4108-AA02-DFA0A04FC94B}">
-              <ma14:wrappingTextBoxFlag xmlns:ma14="http://schemas.microsoft.com/office/mac/drawingml/2011/main" xmlns:a14="http://schemas.microsoft.com/office/drawing/2010/main" xmlns:m="http://schemas.openxmlformats.org/officeDocument/2006/math" xmlns="" val="1"/>
+              <ma14:wrappingTextBoxFlag xmlns="" xmlns:m="http://schemas.openxmlformats.org/officeDocument/2006/math" xmlns:a14="http://schemas.microsoft.com/office/drawing/2010/main" xmlns:ma14="http://schemas.microsoft.com/office/mac/drawingml/2011/main" val="1"/>
             </a:ext>
           </a:extLst>
         </p:spPr>
@@ -23934,7 +24109,7 @@
           </a:ln>
           <a:extLst>
             <a:ext uri="{C572A759-6A51-4108-AA02-DFA0A04FC94B}">
-              <ma14:wrappingTextBoxFlag xmlns:ma14="http://schemas.microsoft.com/office/mac/drawingml/2011/main" xmlns:a14="http://schemas.microsoft.com/office/drawing/2010/main" xmlns:m="http://schemas.openxmlformats.org/officeDocument/2006/math" xmlns="" val="1"/>
+              <ma14:wrappingTextBoxFlag xmlns="" xmlns:m="http://schemas.openxmlformats.org/officeDocument/2006/math" xmlns:a14="http://schemas.microsoft.com/office/drawing/2010/main" xmlns:ma14="http://schemas.microsoft.com/office/mac/drawingml/2011/main" val="1"/>
             </a:ext>
           </a:extLst>
         </p:spPr>
@@ -24078,7 +24253,7 @@
           </a:ln>
           <a:extLst>
             <a:ext uri="{C572A759-6A51-4108-AA02-DFA0A04FC94B}">
-              <ma14:wrappingTextBoxFlag xmlns:ma14="http://schemas.microsoft.com/office/mac/drawingml/2011/main" xmlns:a14="http://schemas.microsoft.com/office/drawing/2010/main" xmlns:m="http://schemas.openxmlformats.org/officeDocument/2006/math" xmlns="" val="1"/>
+              <ma14:wrappingTextBoxFlag xmlns="" xmlns:m="http://schemas.openxmlformats.org/officeDocument/2006/math" xmlns:a14="http://schemas.microsoft.com/office/drawing/2010/main" xmlns:ma14="http://schemas.microsoft.com/office/mac/drawingml/2011/main" val="1"/>
             </a:ext>
           </a:extLst>
         </p:spPr>
@@ -26395,9 +26570,7 @@
           <p:nvPr/>
         </p:nvPicPr>
         <p:blipFill>
-          <a:blip r:embed="rId10">
-            <a:extLst/>
-          </a:blip>
+          <a:blip r:embed="rId10"/>
           <a:stretch>
             <a:fillRect/>
           </a:stretch>
@@ -26438,9 +26611,7 @@
             <p:nvPr/>
           </p:nvPicPr>
           <p:blipFill>
-            <a:blip r:embed="rId11">
-              <a:extLst/>
-            </a:blip>
+            <a:blip r:embed="rId11"/>
             <a:stretch>
               <a:fillRect/>
             </a:stretch>
@@ -26800,9 +26971,7 @@
               <p:nvPr/>
             </p:nvPicPr>
             <p:blipFill>
-              <a:blip r:embed="rId11">
-                <a:extLst/>
-              </a:blip>
+              <a:blip r:embed="rId11"/>
               <a:stretch>
                 <a:fillRect/>
               </a:stretch>
@@ -26882,9 +27051,7 @@
               <p:nvPr/>
             </p:nvPicPr>
             <p:blipFill>
-              <a:blip r:embed="rId11">
-                <a:extLst/>
-              </a:blip>
+              <a:blip r:embed="rId11"/>
               <a:srcRect l="50670" t="5520" r="2092" b="17626"/>
               <a:stretch>
                 <a:fillRect/>
@@ -26962,9 +27129,7 @@
               <p:nvPr/>
             </p:nvPicPr>
             <p:blipFill>
-              <a:blip r:embed="rId11">
-                <a:extLst/>
-              </a:blip>
+              <a:blip r:embed="rId11"/>
               <a:srcRect l="73554" t="25553" r="2092" b="55133"/>
               <a:stretch>
                 <a:fillRect/>
@@ -27042,9 +27207,7 @@
               <p:nvPr/>
             </p:nvPicPr>
             <p:blipFill>
-              <a:blip r:embed="rId11">
-                <a:extLst/>
-              </a:blip>
+              <a:blip r:embed="rId11"/>
               <a:srcRect l="73554" t="34350" r="2092" b="60546"/>
               <a:stretch>
                 <a:fillRect/>
@@ -27103,7 +27266,7 @@
             <a:effectLst/>
             <a:extLst>
               <a:ext uri="{C572A759-6A51-4108-AA02-DFA0A04FC94B}">
-                <ma14:wrappingTextBoxFlag xmlns:ma14="http://schemas.microsoft.com/office/mac/drawingml/2011/main" xmlns:a14="http://schemas.microsoft.com/office/drawing/2010/main" xmlns:m="http://schemas.openxmlformats.org/officeDocument/2006/math" xmlns="" val="1"/>
+                <ma14:wrappingTextBoxFlag xmlns="" xmlns:m="http://schemas.openxmlformats.org/officeDocument/2006/math" xmlns:a14="http://schemas.microsoft.com/office/drawing/2010/main" xmlns:ma14="http://schemas.microsoft.com/office/mac/drawingml/2011/main" val="1"/>
               </a:ext>
             </a:extLst>
           </p:spPr>
@@ -27185,9 +27348,7 @@
               <p:nvPr/>
             </p:nvPicPr>
             <p:blipFill>
-              <a:blip r:embed="rId10">
-                <a:extLst/>
-              </a:blip>
+              <a:blip r:embed="rId10"/>
               <a:stretch>
                 <a:fillRect/>
               </a:stretch>
@@ -27374,9 +27535,7 @@
               <p:nvPr/>
             </p:nvPicPr>
             <p:blipFill>
-              <a:blip r:embed="rId10">
-                <a:extLst/>
-              </a:blip>
+              <a:blip r:embed="rId10"/>
               <a:stretch>
                 <a:fillRect/>
               </a:stretch>
@@ -28364,9 +28523,7 @@
             <p:nvPr/>
           </p:nvPicPr>
           <p:blipFill>
-            <a:blip r:embed="rId10">
-              <a:extLst/>
-            </a:blip>
+            <a:blip r:embed="rId10"/>
             <a:stretch>
               <a:fillRect/>
             </a:stretch>
@@ -28594,9 +28751,7 @@
             <p:nvPr/>
           </p:nvPicPr>
           <p:blipFill>
-            <a:blip r:embed="rId10">
-              <a:extLst/>
-            </a:blip>
+            <a:blip r:embed="rId10"/>
             <a:stretch>
               <a:fillRect/>
             </a:stretch>
@@ -28774,9 +28929,7 @@
             <p:nvPr/>
           </p:nvPicPr>
           <p:blipFill>
-            <a:blip r:embed="rId10">
-              <a:extLst/>
-            </a:blip>
+            <a:blip r:embed="rId10"/>
             <a:stretch>
               <a:fillRect/>
             </a:stretch>
@@ -28949,9 +29102,7 @@
           <p:nvPr/>
         </p:nvPicPr>
         <p:blipFill>
-          <a:blip r:embed="rId12">
-            <a:extLst/>
-          </a:blip>
+          <a:blip r:embed="rId12"/>
           <a:stretch>
             <a:fillRect/>
           </a:stretch>

</xml_diff>

<commit_message>
fix typos in cheatsheet
fix #76
</commit_message>
<xml_diff>
--- a/cheatsheet/labelled_cheatsheet.pptx
+++ b/cheatsheet/labelled_cheatsheet.pptx
@@ -2273,7 +2273,7 @@
           </a:ln>
           <a:extLst>
             <a:ext uri="{C572A759-6A51-4108-AA02-DFA0A04FC94B}">
-              <ma14:wrappingTextBoxFlag xmlns:ma14="http://schemas.microsoft.com/office/mac/drawingml/2011/main" xmlns:a14="http://schemas.microsoft.com/office/drawing/2010/main" xmlns:m="http://schemas.openxmlformats.org/officeDocument/2006/math" xmlns="" val="1"/>
+              <ma14:wrappingTextBoxFlag xmlns="" xmlns:m="http://schemas.openxmlformats.org/officeDocument/2006/math" xmlns:a14="http://schemas.microsoft.com/office/drawing/2010/main" xmlns:ma14="http://schemas.microsoft.com/office/mac/drawingml/2011/main" val="1"/>
             </a:ext>
           </a:extLst>
         </p:spPr>
@@ -2312,7 +2312,7 @@
           </a:ln>
           <a:extLst>
             <a:ext uri="{C572A759-6A51-4108-AA02-DFA0A04FC94B}">
-              <ma14:wrappingTextBoxFlag xmlns:ma14="http://schemas.microsoft.com/office/mac/drawingml/2011/main" xmlns:a14="http://schemas.microsoft.com/office/drawing/2010/main" xmlns:m="http://schemas.openxmlformats.org/officeDocument/2006/math" xmlns="" val="1"/>
+              <ma14:wrappingTextBoxFlag xmlns="" xmlns:m="http://schemas.openxmlformats.org/officeDocument/2006/math" xmlns:a14="http://schemas.microsoft.com/office/drawing/2010/main" xmlns:ma14="http://schemas.microsoft.com/office/mac/drawingml/2011/main" val="1"/>
             </a:ext>
           </a:extLst>
         </p:spPr>
@@ -4291,7 +4291,7 @@
           </a:ln>
           <a:extLst>
             <a:ext uri="{C572A759-6A51-4108-AA02-DFA0A04FC94B}">
-              <ma14:wrappingTextBoxFlag xmlns:ma14="http://schemas.microsoft.com/office/mac/drawingml/2011/main" xmlns:a14="http://schemas.microsoft.com/office/drawing/2010/main" xmlns:m="http://schemas.openxmlformats.org/officeDocument/2006/math" xmlns="" val="1"/>
+              <ma14:wrappingTextBoxFlag xmlns="" xmlns:m="http://schemas.openxmlformats.org/officeDocument/2006/math" xmlns:a14="http://schemas.microsoft.com/office/drawing/2010/main" xmlns:ma14="http://schemas.microsoft.com/office/mac/drawingml/2011/main" val="1"/>
             </a:ext>
           </a:extLst>
         </p:spPr>
@@ -4327,7 +4327,7 @@
             </a:r>
             <a:r>
               <a:rPr lang="en-US" dirty="0"/>
-              <a:t> •  labelled version  2.6.0 •  Updated: 2020-09</a:t>
+              <a:t> •  labelled version  2.7.0 •  Updated: 2020-12</a:t>
             </a:r>
           </a:p>
         </p:txBody>
@@ -4557,7 +4557,7 @@
           </a:ln>
           <a:extLst>
             <a:ext uri="{C572A759-6A51-4108-AA02-DFA0A04FC94B}">
-              <ma14:wrappingTextBoxFlag xmlns:ma14="http://schemas.microsoft.com/office/mac/drawingml/2011/main" xmlns:a14="http://schemas.microsoft.com/office/drawing/2010/main" xmlns:m="http://schemas.openxmlformats.org/officeDocument/2006/math" xmlns="" val="1"/>
+              <ma14:wrappingTextBoxFlag xmlns="" xmlns:m="http://schemas.openxmlformats.org/officeDocument/2006/math" xmlns:a14="http://schemas.microsoft.com/office/drawing/2010/main" xmlns:ma14="http://schemas.microsoft.com/office/mac/drawingml/2011/main" val="1"/>
             </a:ext>
           </a:extLst>
         </p:spPr>
@@ -4683,7 +4683,7 @@
             <a:effectLst/>
             <a:extLst>
               <a:ext uri="{C572A759-6A51-4108-AA02-DFA0A04FC94B}">
-                <ma14:wrappingTextBoxFlag xmlns:ma14="http://schemas.microsoft.com/office/mac/drawingml/2011/main" xmlns:a14="http://schemas.microsoft.com/office/drawing/2010/main" xmlns:m="http://schemas.openxmlformats.org/officeDocument/2006/math" xmlns="" val="1"/>
+                <ma14:wrappingTextBoxFlag xmlns="" xmlns:m="http://schemas.openxmlformats.org/officeDocument/2006/math" xmlns:a14="http://schemas.microsoft.com/office/drawing/2010/main" xmlns:ma14="http://schemas.microsoft.com/office/mac/drawingml/2011/main" val="1"/>
               </a:ext>
             </a:extLst>
           </p:spPr>
@@ -5486,7 +5486,7 @@
             <a:effectLst/>
             <a:extLst>
               <a:ext uri="{C572A759-6A51-4108-AA02-DFA0A04FC94B}">
-                <ma14:wrappingTextBoxFlag xmlns:ma14="http://schemas.microsoft.com/office/mac/drawingml/2011/main" xmlns:a14="http://schemas.microsoft.com/office/drawing/2010/main" xmlns:m="http://schemas.openxmlformats.org/officeDocument/2006/math" xmlns="" val="1"/>
+                <ma14:wrappingTextBoxFlag xmlns="" xmlns:m="http://schemas.openxmlformats.org/officeDocument/2006/math" xmlns:a14="http://schemas.microsoft.com/office/drawing/2010/main" xmlns:ma14="http://schemas.microsoft.com/office/mac/drawingml/2011/main" val="1"/>
               </a:ext>
             </a:extLst>
           </p:spPr>
@@ -5609,7 +5609,7 @@
             <a:effectLst/>
             <a:extLst>
               <a:ext uri="{C572A759-6A51-4108-AA02-DFA0A04FC94B}">
-                <ma14:wrappingTextBoxFlag xmlns:ma14="http://schemas.microsoft.com/office/mac/drawingml/2011/main" xmlns:a14="http://schemas.microsoft.com/office/drawing/2010/main" xmlns:m="http://schemas.openxmlformats.org/officeDocument/2006/math" xmlns="" val="1"/>
+                <ma14:wrappingTextBoxFlag xmlns="" xmlns:m="http://schemas.openxmlformats.org/officeDocument/2006/math" xmlns:a14="http://schemas.microsoft.com/office/drawing/2010/main" xmlns:ma14="http://schemas.microsoft.com/office/mac/drawingml/2011/main" val="1"/>
               </a:ext>
             </a:extLst>
           </p:spPr>
@@ -5994,7 +5994,7 @@
             <a:effectLst/>
             <a:extLst>
               <a:ext uri="{C572A759-6A51-4108-AA02-DFA0A04FC94B}">
-                <ma14:wrappingTextBoxFlag xmlns:ma14="http://schemas.microsoft.com/office/mac/drawingml/2011/main" xmlns:a14="http://schemas.microsoft.com/office/drawing/2010/main" xmlns:m="http://schemas.openxmlformats.org/officeDocument/2006/math" xmlns="" val="1"/>
+                <ma14:wrappingTextBoxFlag xmlns="" xmlns:m="http://schemas.openxmlformats.org/officeDocument/2006/math" xmlns:a14="http://schemas.microsoft.com/office/drawing/2010/main" xmlns:ma14="http://schemas.microsoft.com/office/mac/drawingml/2011/main" val="1"/>
               </a:ext>
             </a:extLst>
           </p:spPr>
@@ -6630,7 +6630,7 @@
             <a:effectLst/>
             <a:extLst>
               <a:ext uri="{C572A759-6A51-4108-AA02-DFA0A04FC94B}">
-                <ma14:wrappingTextBoxFlag xmlns:ma14="http://schemas.microsoft.com/office/mac/drawingml/2011/main" xmlns:a14="http://schemas.microsoft.com/office/drawing/2010/main" xmlns:m="http://schemas.openxmlformats.org/officeDocument/2006/math" xmlns="" val="1"/>
+                <ma14:wrappingTextBoxFlag xmlns="" xmlns:m="http://schemas.openxmlformats.org/officeDocument/2006/math" xmlns:a14="http://schemas.microsoft.com/office/drawing/2010/main" xmlns:ma14="http://schemas.microsoft.com/office/mac/drawingml/2011/main" val="1"/>
               </a:ext>
             </a:extLst>
           </p:spPr>
@@ -6753,7 +6753,7 @@
             <a:effectLst/>
             <a:extLst>
               <a:ext uri="{C572A759-6A51-4108-AA02-DFA0A04FC94B}">
-                <ma14:wrappingTextBoxFlag xmlns:ma14="http://schemas.microsoft.com/office/mac/drawingml/2011/main" xmlns:a14="http://schemas.microsoft.com/office/drawing/2010/main" xmlns:m="http://schemas.openxmlformats.org/officeDocument/2006/math" xmlns="" val="1"/>
+                <ma14:wrappingTextBoxFlag xmlns="" xmlns:m="http://schemas.openxmlformats.org/officeDocument/2006/math" xmlns:a14="http://schemas.microsoft.com/office/drawing/2010/main" xmlns:ma14="http://schemas.microsoft.com/office/mac/drawingml/2011/main" val="1"/>
               </a:ext>
             </a:extLst>
           </p:spPr>
@@ -7183,7 +7183,7 @@
             <a:effectLst/>
             <a:extLst>
               <a:ext uri="{C572A759-6A51-4108-AA02-DFA0A04FC94B}">
-                <ma14:wrappingTextBoxFlag xmlns:ma14="http://schemas.microsoft.com/office/mac/drawingml/2011/main" xmlns:a14="http://schemas.microsoft.com/office/drawing/2010/main" xmlns:m="http://schemas.openxmlformats.org/officeDocument/2006/math" xmlns="" val="1"/>
+                <ma14:wrappingTextBoxFlag xmlns="" xmlns:m="http://schemas.openxmlformats.org/officeDocument/2006/math" xmlns:a14="http://schemas.microsoft.com/office/drawing/2010/main" xmlns:ma14="http://schemas.microsoft.com/office/mac/drawingml/2011/main" val="1"/>
               </a:ext>
             </a:extLst>
           </p:spPr>
@@ -7712,7 +7712,7 @@
             <a:effectLst/>
             <a:extLst>
               <a:ext uri="{C572A759-6A51-4108-AA02-DFA0A04FC94B}">
-                <ma14:wrappingTextBoxFlag xmlns:ma14="http://schemas.microsoft.com/office/mac/drawingml/2011/main" xmlns:a14="http://schemas.microsoft.com/office/drawing/2010/main" xmlns:m="http://schemas.openxmlformats.org/officeDocument/2006/math" xmlns="" val="1"/>
+                <ma14:wrappingTextBoxFlag xmlns="" xmlns:m="http://schemas.openxmlformats.org/officeDocument/2006/math" xmlns:a14="http://schemas.microsoft.com/office/drawing/2010/main" xmlns:ma14="http://schemas.microsoft.com/office/mac/drawingml/2011/main" val="1"/>
               </a:ext>
             </a:extLst>
           </p:spPr>
@@ -8518,7 +8518,7 @@
             <a:effectLst/>
             <a:extLst>
               <a:ext uri="{C572A759-6A51-4108-AA02-DFA0A04FC94B}">
-                <ma14:wrappingTextBoxFlag xmlns:ma14="http://schemas.microsoft.com/office/mac/drawingml/2011/main" xmlns:a14="http://schemas.microsoft.com/office/drawing/2010/main" xmlns:m="http://schemas.openxmlformats.org/officeDocument/2006/math" xmlns="" val="1"/>
+                <ma14:wrappingTextBoxFlag xmlns="" xmlns:m="http://schemas.openxmlformats.org/officeDocument/2006/math" xmlns:a14="http://schemas.microsoft.com/office/drawing/2010/main" xmlns:ma14="http://schemas.microsoft.com/office/mac/drawingml/2011/main" val="1"/>
               </a:ext>
             </a:extLst>
           </p:spPr>
@@ -11315,7 +11315,7 @@
             <a:effectLst/>
             <a:extLst>
               <a:ext uri="{C572A759-6A51-4108-AA02-DFA0A04FC94B}">
-                <ma14:wrappingTextBoxFlag xmlns:ma14="http://schemas.microsoft.com/office/mac/drawingml/2011/main" xmlns:a14="http://schemas.microsoft.com/office/drawing/2010/main" xmlns:m="http://schemas.openxmlformats.org/officeDocument/2006/math" xmlns="" val="1"/>
+                <ma14:wrappingTextBoxFlag xmlns="" xmlns:m="http://schemas.openxmlformats.org/officeDocument/2006/math" xmlns:a14="http://schemas.microsoft.com/office/drawing/2010/main" xmlns:ma14="http://schemas.microsoft.com/office/mac/drawingml/2011/main" val="1"/>
               </a:ext>
             </a:extLst>
           </p:spPr>
@@ -12491,7 +12491,7 @@
           </a:ln>
           <a:extLst>
             <a:ext uri="{C572A759-6A51-4108-AA02-DFA0A04FC94B}">
-              <ma14:wrappingTextBoxFlag xmlns:ma14="http://schemas.microsoft.com/office/mac/drawingml/2011/main" xmlns:a14="http://schemas.microsoft.com/office/drawing/2010/main" xmlns:m="http://schemas.openxmlformats.org/officeDocument/2006/math" xmlns="" val="1"/>
+              <ma14:wrappingTextBoxFlag xmlns="" xmlns:m="http://schemas.openxmlformats.org/officeDocument/2006/math" xmlns:a14="http://schemas.microsoft.com/office/drawing/2010/main" xmlns:ma14="http://schemas.microsoft.com/office/mac/drawingml/2011/main" val="1"/>
             </a:ext>
           </a:extLst>
         </p:spPr>
@@ -12527,7 +12527,7 @@
             </a:r>
             <a:r>
               <a:rPr lang="en-US" dirty="0"/>
-              <a:t> •  labelled version  2.6.0 •  Updated: 2020-09</a:t>
+              <a:t> •  labelled version  2.7.0 •  Updated: 2020-12</a:t>
             </a:r>
           </a:p>
         </p:txBody>
@@ -12547,7 +12547,7 @@
         <p:spPr>
           <a:xfrm>
             <a:off x="306210" y="752199"/>
-            <a:ext cx="3529812" cy="340029"/>
+            <a:ext cx="2955937" cy="340029"/>
           </a:xfrm>
           <a:prstGeom prst="rect">
             <a:avLst/>
@@ -12557,7 +12557,7 @@
           </a:ln>
           <a:extLst>
             <a:ext uri="{C572A759-6A51-4108-AA02-DFA0A04FC94B}">
-              <ma14:wrappingTextBoxFlag xmlns:ma14="http://schemas.microsoft.com/office/mac/drawingml/2011/main" xmlns:a14="http://schemas.microsoft.com/office/drawing/2010/main" xmlns:m="http://schemas.openxmlformats.org/officeDocument/2006/math" xmlns="" val="1"/>
+              <ma14:wrappingTextBoxFlag xmlns="" xmlns:m="http://schemas.openxmlformats.org/officeDocument/2006/math" xmlns:a14="http://schemas.microsoft.com/office/drawing/2010/main" xmlns:ma14="http://schemas.microsoft.com/office/mac/drawingml/2011/main" val="1"/>
             </a:ext>
           </a:extLst>
         </p:spPr>
@@ -12581,16 +12581,16 @@
               </a:defRPr>
             </a:pPr>
             <a:r>
-              <a:rPr lang="fr-FR" dirty="0"/>
-              <a:t>When </a:t>
-            </a:r>
-            <a:r>
               <a:rPr lang="fr-FR" dirty="0" err="1"/>
-              <a:t>using</a:t>
+              <a:t>What</a:t>
             </a:r>
             <a:r>
               <a:rPr lang="fr-FR" dirty="0"/>
               <a:t> </a:t>
+            </a:r>
+            <a:r>
+              <a:rPr lang="fr-FR"/>
+              <a:t>is </a:t>
             </a:r>
             <a:r>
               <a:rPr lang="fr-FR" dirty="0" err="1"/>
@@ -12887,7 +12887,7 @@
             <a:effectLst/>
             <a:extLst>
               <a:ext uri="{C572A759-6A51-4108-AA02-DFA0A04FC94B}">
-                <ma14:wrappingTextBoxFlag xmlns:ma14="http://schemas.microsoft.com/office/mac/drawingml/2011/main" xmlns:a14="http://schemas.microsoft.com/office/drawing/2010/main" xmlns:m="http://schemas.openxmlformats.org/officeDocument/2006/math" xmlns="" val="1"/>
+                <ma14:wrappingTextBoxFlag xmlns="" xmlns:m="http://schemas.openxmlformats.org/officeDocument/2006/math" xmlns:a14="http://schemas.microsoft.com/office/drawing/2010/main" xmlns:ma14="http://schemas.microsoft.com/office/mac/drawingml/2011/main" val="1"/>
               </a:ext>
             </a:extLst>
           </p:spPr>
@@ -13297,7 +13297,7 @@
             <a:effectLst/>
             <a:extLst>
               <a:ext uri="{C572A759-6A51-4108-AA02-DFA0A04FC94B}">
-                <ma14:wrappingTextBoxFlag xmlns:ma14="http://schemas.microsoft.com/office/mac/drawingml/2011/main" xmlns:a14="http://schemas.microsoft.com/office/drawing/2010/main" xmlns:m="http://schemas.openxmlformats.org/officeDocument/2006/math" xmlns="" val="1"/>
+                <ma14:wrappingTextBoxFlag xmlns="" xmlns:m="http://schemas.openxmlformats.org/officeDocument/2006/math" xmlns:a14="http://schemas.microsoft.com/office/drawing/2010/main" xmlns:ma14="http://schemas.microsoft.com/office/mac/drawingml/2011/main" val="1"/>
               </a:ext>
             </a:extLst>
           </p:spPr>
@@ -13420,7 +13420,7 @@
             <a:effectLst/>
             <a:extLst>
               <a:ext uri="{C572A759-6A51-4108-AA02-DFA0A04FC94B}">
-                <ma14:wrappingTextBoxFlag xmlns:ma14="http://schemas.microsoft.com/office/mac/drawingml/2011/main" xmlns:a14="http://schemas.microsoft.com/office/drawing/2010/main" xmlns:m="http://schemas.openxmlformats.org/officeDocument/2006/math" xmlns="" val="1"/>
+                <ma14:wrappingTextBoxFlag xmlns="" xmlns:m="http://schemas.openxmlformats.org/officeDocument/2006/math" xmlns:a14="http://schemas.microsoft.com/office/drawing/2010/main" xmlns:ma14="http://schemas.microsoft.com/office/mac/drawingml/2011/main" val="1"/>
               </a:ext>
             </a:extLst>
           </p:spPr>
@@ -15390,23 +15390,7 @@
                   <a:srgbClr val="000000"/>
                 </a:solidFill>
               </a:rPr>
-              <a:t>be </a:t>
-            </a:r>
-            <a:r>
-              <a:rPr lang="en-GB" b="0" i="1" dirty="0" err="1">
-                <a:solidFill>
-                  <a:srgbClr val="000000"/>
-                </a:solidFill>
-              </a:rPr>
-              <a:t>identitical</a:t>
-            </a:r>
-            <a:r>
-              <a:rPr lang="en-GB" b="0" i="1" dirty="0">
-                <a:solidFill>
-                  <a:srgbClr val="000000"/>
-                </a:solidFill>
-              </a:rPr>
-              <a:t> (original coding will be lost).</a:t>
+              <a:t>be identical (original coding will be lost).</a:t>
             </a:r>
           </a:p>
           <a:p>
@@ -15806,7 +15790,7 @@
             <a:effectLst/>
             <a:extLst>
               <a:ext uri="{C572A759-6A51-4108-AA02-DFA0A04FC94B}">
-                <ma14:wrappingTextBoxFlag xmlns:ma14="http://schemas.microsoft.com/office/mac/drawingml/2011/main" xmlns:a14="http://schemas.microsoft.com/office/drawing/2010/main" xmlns:m="http://schemas.openxmlformats.org/officeDocument/2006/math" xmlns="" val="1"/>
+                <ma14:wrappingTextBoxFlag xmlns="" xmlns:m="http://schemas.openxmlformats.org/officeDocument/2006/math" xmlns:a14="http://schemas.microsoft.com/office/drawing/2010/main" xmlns:ma14="http://schemas.microsoft.com/office/mac/drawingml/2011/main" val="1"/>
               </a:ext>
             </a:extLst>
           </p:spPr>

</xml_diff>